<commit_message>
typo gray-edges.pptx, reword FP_recitation_coloring and FP_odd_length_walk, minor tweak FP_sum_of_odd_squares
</commit_message>
<xml_diff>
--- a/fall15/slidesF15/gray-edges.pptx
+++ b/fall15/slidesF15/gray-edges.pptx
@@ -30,16 +30,16 @@
     <p:sldId id="616" r:id="rId18"/>
     <p:sldId id="618" r:id="rId19"/>
     <p:sldId id="619" r:id="rId20"/>
-    <p:sldId id="579" r:id="rId21"/>
-    <p:sldId id="622" r:id="rId22"/>
-    <p:sldId id="592" r:id="rId23"/>
-    <p:sldId id="593" r:id="rId24"/>
-    <p:sldId id="594" r:id="rId25"/>
-    <p:sldId id="620" r:id="rId26"/>
-    <p:sldId id="595" r:id="rId27"/>
-    <p:sldId id="596" r:id="rId28"/>
-    <p:sldId id="597" r:id="rId29"/>
-    <p:sldId id="598" r:id="rId30"/>
+    <p:sldId id="592" r:id="rId21"/>
+    <p:sldId id="593" r:id="rId22"/>
+    <p:sldId id="594" r:id="rId23"/>
+    <p:sldId id="620" r:id="rId24"/>
+    <p:sldId id="595" r:id="rId25"/>
+    <p:sldId id="596" r:id="rId26"/>
+    <p:sldId id="597" r:id="rId27"/>
+    <p:sldId id="598" r:id="rId28"/>
+    <p:sldId id="621" r:id="rId29"/>
+    <p:sldId id="622" r:id="rId30"/>
   </p:sldIdLst>
   <p:sldSz cx="9144000" cy="6858000" type="letter"/>
   <p:notesSz cx="9601200" cy="7315200"/>
@@ -979,7 +979,7 @@
             <a:fld id="{2290380C-F846-4D61-BB06-6FCFBA28E193}" type="slidenum">
               <a:rPr lang="en-US" smtClean="0"/>
               <a:pPr/>
-              <a:t>24</a:t>
+              <a:t>22</a:t>
             </a:fld>
             <a:endParaRPr lang="en-US"/>
           </a:p>
@@ -1064,7 +1064,7 @@
             <a:fld id="{2290380C-F846-4D61-BB06-6FCFBA28E193}" type="slidenum">
               <a:rPr lang="en-US" smtClean="0"/>
               <a:pPr/>
-              <a:t>27</a:t>
+              <a:t>25</a:t>
             </a:fld>
             <a:endParaRPr lang="en-US"/>
           </a:p>
@@ -1149,7 +1149,7 @@
             <a:fld id="{2290380C-F846-4D61-BB06-6FCFBA28E193}" type="slidenum">
               <a:rPr lang="en-US" smtClean="0"/>
               <a:pPr/>
-              <a:t>28</a:t>
+              <a:t>26</a:t>
             </a:fld>
             <a:endParaRPr lang="en-US"/>
           </a:p>
@@ -3732,25 +3732,25 @@
           <p:nvPr>
             <p:extLst>
               <p:ext uri="{D42A27DB-BD31-4B8C-83A1-F6EECF244321}">
-                <p14:modId xmlns:p14="http://schemas.microsoft.com/office/powerpoint/2010/main" val="1079804529"/>
+                <p14:modId xmlns:p14="http://schemas.microsoft.com/office/powerpoint/2010/main" val="2613430238"/>
               </p:ext>
             </p:extLst>
           </p:nvPr>
         </p:nvGraphicFramePr>
         <p:xfrm>
-          <a:off x="1611312" y="2198688"/>
-          <a:ext cx="6618288" cy="1630362"/>
+          <a:off x="1643401" y="2590800"/>
+          <a:ext cx="7043399" cy="949510"/>
         </p:xfrm>
         <a:graphic>
           <a:graphicData uri="http://schemas.openxmlformats.org/presentationml/2006/ole">
             <mc:AlternateContent xmlns:mc="http://schemas.openxmlformats.org/markup-compatibility/2006">
               <mc:Choice xmlns:v="urn:schemas-microsoft-com:vml" Requires="v">
-                <p:oleObj spid="_x0000_s2069" name="Equation" r:id="rId3" imgW="876300" imgH="215900" progId="Equation.DSMT4">
+                <p:oleObj spid="_x0000_s2074" name="Equation" r:id="rId3" imgW="1130300" imgH="152400" progId="Equation.DSMT4">
                   <p:embed/>
                 </p:oleObj>
               </mc:Choice>
               <mc:Fallback>
-                <p:oleObj name="Equation" r:id="rId3" imgW="876300" imgH="215900" progId="Equation.DSMT4">
+                <p:oleObj name="Equation" r:id="rId3" imgW="1130300" imgH="152400" progId="Equation.DSMT4">
                   <p:embed/>
                   <p:pic>
                     <p:nvPicPr>
@@ -3766,8 +3766,8 @@
                     </p:blipFill>
                     <p:spPr>
                       <a:xfrm>
-                        <a:off x="1611312" y="2198688"/>
-                        <a:ext cx="6618288" cy="1630362"/>
+                        <a:off x="1643401" y="2590800"/>
+                        <a:ext cx="7043399" cy="949510"/>
                       </a:xfrm>
                       <a:prstGeom prst="rect">
                         <a:avLst/>
@@ -3802,7 +3802,7 @@
           <a:graphicData uri="http://schemas.openxmlformats.org/presentationml/2006/ole">
             <mc:AlternateContent xmlns:mc="http://schemas.openxmlformats.org/markup-compatibility/2006">
               <mc:Choice xmlns:v="urn:schemas-microsoft-com:vml" Requires="v">
-                <p:oleObj spid="_x0000_s2070" name="Equation" r:id="rId5" imgW="889000" imgH="190500" progId="Equation.DSMT4">
+                <p:oleObj spid="_x0000_s2075" name="Equation" r:id="rId5" imgW="889000" imgH="190500" progId="Equation.DSMT4">
                   <p:embed/>
                 </p:oleObj>
               </mc:Choice>
@@ -6226,11 +6226,7 @@
             </a:r>
             <a:r>
               <a:rPr lang="en-US" sz="5400" dirty="0" smtClean="0"/>
-              <a:t> </a:t>
-            </a:r>
-            <a:r>
-              <a:rPr lang="en-US" sz="5400" dirty="0" smtClean="0"/>
-              <a:t>connects</a:t>
+              <a:t> connects</a:t>
             </a:r>
           </a:p>
           <a:p>
@@ -13131,7 +13127,7 @@
           <a:graphicData uri="http://schemas.openxmlformats.org/presentationml/2006/ole">
             <mc:AlternateContent xmlns:mc="http://schemas.openxmlformats.org/markup-compatibility/2006">
               <mc:Choice xmlns:v="urn:schemas-microsoft-com:vml" Requires="v">
-                <p:oleObj spid="_x0000_s9223" name="Equation" r:id="rId3" imgW="546100" imgH="228600" progId="Equation.DSMT4">
+                <p:oleObj spid="_x0000_s9226" name="Equation" r:id="rId3" imgW="546100" imgH="228600" progId="Equation.DSMT4">
                   <p:embed/>
                 </p:oleObj>
               </mc:Choice>
@@ -15469,7 +15465,7 @@
           <a:graphicData uri="http://schemas.openxmlformats.org/presentationml/2006/ole">
             <mc:AlternateContent xmlns:mc="http://schemas.openxmlformats.org/markup-compatibility/2006">
               <mc:Choice xmlns:v="urn:schemas-microsoft-com:vml" Requires="v">
-                <p:oleObj spid="_x0000_s10246" name="Equation" r:id="rId3" imgW="647700" imgH="228600" progId="Equation.DSMT4">
+                <p:oleObj spid="_x0000_s10249" name="Equation" r:id="rId3" imgW="647700" imgH="228600" progId="Equation.DSMT4">
                   <p:embed/>
                 </p:oleObj>
               </mc:Choice>
@@ -15666,7 +15662,7 @@
           <a:graphicData uri="http://schemas.openxmlformats.org/presentationml/2006/ole">
             <mc:AlternateContent xmlns:mc="http://schemas.openxmlformats.org/markup-compatibility/2006">
               <mc:Choice xmlns:v="urn:schemas-microsoft-com:vml" Requires="v">
-                <p:oleObj spid="_x0000_s11271" name="Equation" r:id="rId3" imgW="1016000" imgH="228600" progId="Equation.DSMT4">
+                <p:oleObj spid="_x0000_s11274" name="Equation" r:id="rId3" imgW="1016000" imgH="228600" progId="Equation.DSMT4">
                   <p:embed/>
                 </p:oleObj>
               </mc:Choice>
@@ -16058,7 +16054,7 @@
           <a:graphicData uri="http://schemas.openxmlformats.org/presentationml/2006/ole">
             <mc:AlternateContent xmlns:mc="http://schemas.openxmlformats.org/markup-compatibility/2006">
               <mc:Choice xmlns:v="urn:schemas-microsoft-com:vml" Requires="v">
-                <p:oleObj spid="_x0000_s1027" name="Equation" r:id="rId3" imgW="1016000" imgH="228600" progId="Equation.DSMT4">
+                <p:oleObj spid="_x0000_s1030" name="Equation" r:id="rId3" imgW="1016000" imgH="228600" progId="Equation.DSMT4">
                   <p:embed/>
                 </p:oleObj>
               </mc:Choice>
@@ -16275,11 +16271,11 @@
   <p:clrMapOvr>
     <a:masterClrMapping/>
   </p:clrMapOvr>
-  <mc:AlternateContent xmlns:mc="http://schemas.openxmlformats.org/markup-compatibility/2006">
-    <mc:Choice xmlns:p14="http://schemas.microsoft.com/office/powerpoint/2010/main" Requires="p14">
+  <mc:AlternateContent xmlns:mc="http://schemas.openxmlformats.org/markup-compatibility/2006" xmlns:p14="http://schemas.microsoft.com/office/powerpoint/2010/main">
+    <mc:Choice Requires="p14">
       <p:transition p14:dur="0" advClick="0"/>
     </mc:Choice>
-    <mc:Fallback>
+    <mc:Fallback xmlns="">
       <p:transition xmlns:p14="http://schemas.microsoft.com/office/powerpoint/2010/main" advClick="0"/>
     </mc:Fallback>
   </mc:AlternateContent>
@@ -16632,7 +16628,7 @@
           <a:graphicData uri="http://schemas.openxmlformats.org/presentationml/2006/ole">
             <mc:AlternateContent xmlns:mc="http://schemas.openxmlformats.org/markup-compatibility/2006">
               <mc:Choice xmlns:v="urn:schemas-microsoft-com:vml" Requires="v">
-                <p:oleObj spid="_x0000_s14339" name="Equation" r:id="rId3" imgW="1016000" imgH="228600" progId="Equation.DSMT4">
+                <p:oleObj spid="_x0000_s14342" name="Equation" r:id="rId3" imgW="1016000" imgH="228600" progId="Equation.DSMT4">
                   <p:embed/>
                 </p:oleObj>
               </mc:Choice>
@@ -16675,8 +16671,8 @@
         </p:nvSpPr>
         <p:spPr>
           <a:xfrm>
-            <a:off x="1037162" y="2604310"/>
-            <a:ext cx="6963838" cy="2308324"/>
+            <a:off x="1037162" y="2209800"/>
+            <a:ext cx="6963838" cy="3046988"/>
           </a:xfrm>
           <a:prstGeom prst="rect">
             <a:avLst/>
@@ -16692,10 +16688,31 @@
             <a:r>
               <a:rPr lang="en-US" sz="4800" dirty="0" smtClean="0">
                 <a:solidFill>
+                  <a:schemeClr val="tx1">
+                    <a:lumMod val="85000"/>
+                    <a:lumOff val="15000"/>
+                  </a:schemeClr>
+                </a:solidFill>
+              </a:rPr>
+              <a:t>also</a:t>
+            </a:r>
+          </a:p>
+          <a:p>
+            <a:r>
+              <a:rPr lang="en-US" sz="4800" dirty="0" smtClean="0">
+                <a:solidFill>
                   <a:srgbClr val="0000F1"/>
                 </a:solidFill>
               </a:rPr>
-              <a:t>weight (</a:t>
+              <a:t>weight </a:t>
+            </a:r>
+            <a:r>
+              <a:rPr lang="en-US" sz="4800" dirty="0" smtClean="0">
+                <a:solidFill>
+                  <a:srgbClr val="0000F1"/>
+                </a:solidFill>
+              </a:rPr>
+              <a:t>(</a:t>
             </a:r>
             <a:r>
               <a:rPr lang="en-US" sz="4800" dirty="0" smtClean="0">
@@ -16873,11 +16890,11 @@
   <p:clrMapOvr>
     <a:masterClrMapping/>
   </p:clrMapOvr>
-  <mc:AlternateContent xmlns:mc="http://schemas.openxmlformats.org/markup-compatibility/2006">
-    <mc:Choice xmlns:p14="http://schemas.microsoft.com/office/powerpoint/2010/main" Requires="p14">
+  <mc:AlternateContent xmlns:mc="http://schemas.openxmlformats.org/markup-compatibility/2006" xmlns:p14="http://schemas.microsoft.com/office/powerpoint/2010/main">
+    <mc:Choice Requires="p14">
       <p:transition p14:dur="0" advClick="0"/>
     </mc:Choice>
-    <mc:Fallback>
+    <mc:Fallback xmlns="">
       <p:transition xmlns:p14="http://schemas.microsoft.com/office/powerpoint/2010/main" advClick="0"/>
     </mc:Fallback>
   </mc:AlternateContent>
@@ -16947,33 +16964,15 @@
                                   </p:childTnLst>
                                 </p:cTn>
                               </p:par>
-                            </p:childTnLst>
-                          </p:cTn>
-                        </p:par>
-                      </p:childTnLst>
-                    </p:cTn>
-                  </p:par>
-                  <p:par>
-                    <p:cTn id="8" fill="hold">
-                      <p:stCondLst>
-                        <p:cond delay="indefinite"/>
-                      </p:stCondLst>
-                      <p:childTnLst>
-                        <p:par>
-                          <p:cTn id="9" fill="hold">
-                            <p:stCondLst>
-                              <p:cond delay="0"/>
-                            </p:stCondLst>
-                            <p:childTnLst>
                               <p:par>
-                                <p:cTn id="10" presetID="10" presetClass="entr" presetSubtype="0" fill="hold" nodeType="clickEffect">
+                                <p:cTn id="8" presetID="10" presetClass="entr" presetSubtype="0" fill="hold" nodeType="withEffect">
                                   <p:stCondLst>
                                     <p:cond delay="0"/>
                                   </p:stCondLst>
                                   <p:childTnLst>
                                     <p:set>
                                       <p:cBhvr>
-                                        <p:cTn id="11" dur="1" fill="hold">
+                                        <p:cTn id="9" dur="1" fill="hold">
                                           <p:stCondLst>
                                             <p:cond delay="0"/>
                                           </p:stCondLst>
@@ -16995,7 +16994,7 @@
                                     </p:set>
                                     <p:animEffect transition="in" filter="fade">
                                       <p:cBhvr>
-                                        <p:cTn id="12" dur="500"/>
+                                        <p:cTn id="10" dur="500"/>
                                         <p:tgtEl>
                                           <p:spTgt spid="3">
                                             <p:txEl>
@@ -17011,21 +17010,30 @@
                             </p:childTnLst>
                           </p:cTn>
                         </p:par>
+                      </p:childTnLst>
+                    </p:cTn>
+                  </p:par>
+                  <p:par>
+                    <p:cTn id="11" fill="hold">
+                      <p:stCondLst>
+                        <p:cond delay="indefinite"/>
+                      </p:stCondLst>
+                      <p:childTnLst>
                         <p:par>
-                          <p:cTn id="13" fill="hold">
+                          <p:cTn id="12" fill="hold">
                             <p:stCondLst>
-                              <p:cond delay="500"/>
+                              <p:cond delay="0"/>
                             </p:stCondLst>
                             <p:childTnLst>
                               <p:par>
-                                <p:cTn id="14" presetID="22" presetClass="entr" presetSubtype="8" fill="hold" nodeType="afterEffect">
+                                <p:cTn id="13" presetID="10" presetClass="entr" presetSubtype="0" fill="hold" nodeType="clickEffect">
                                   <p:stCondLst>
                                     <p:cond delay="0"/>
                                   </p:stCondLst>
                                   <p:childTnLst>
                                     <p:set>
                                       <p:cBhvr>
-                                        <p:cTn id="15" dur="1" fill="hold">
+                                        <p:cTn id="14" dur="1" fill="hold">
                                           <p:stCondLst>
                                             <p:cond delay="0"/>
                                           </p:stCondLst>
@@ -17045,9 +17053,9 @@
                                         <p:strVal val="visible"/>
                                       </p:to>
                                     </p:set>
-                                    <p:animEffect transition="in" filter="wipe(left)">
+                                    <p:animEffect transition="in" filter="fade">
                                       <p:cBhvr>
-                                        <p:cTn id="16" dur="1000"/>
+                                        <p:cTn id="15" dur="500"/>
                                         <p:tgtEl>
                                           <p:spTgt spid="3">
                                             <p:txEl>
@@ -17063,30 +17071,82 @@
                             </p:childTnLst>
                           </p:cTn>
                         </p:par>
-                      </p:childTnLst>
-                    </p:cTn>
-                  </p:par>
-                  <p:par>
-                    <p:cTn id="17" fill="hold">
-                      <p:stCondLst>
-                        <p:cond delay="indefinite"/>
-                      </p:stCondLst>
-                      <p:childTnLst>
                         <p:par>
-                          <p:cTn id="18" fill="hold">
+                          <p:cTn id="16" fill="hold">
                             <p:stCondLst>
-                              <p:cond delay="0"/>
+                              <p:cond delay="500"/>
                             </p:stCondLst>
                             <p:childTnLst>
                               <p:par>
-                                <p:cTn id="19" presetID="23" presetClass="entr" presetSubtype="16" fill="hold" nodeType="clickEffect">
+                                <p:cTn id="17" presetID="22" presetClass="entr" presetSubtype="8" fill="hold" nodeType="afterEffect">
                                   <p:stCondLst>
                                     <p:cond delay="0"/>
                                   </p:stCondLst>
                                   <p:childTnLst>
                                     <p:set>
                                       <p:cBhvr>
-                                        <p:cTn id="20" dur="1" fill="hold">
+                                        <p:cTn id="18" dur="1" fill="hold">
+                                          <p:stCondLst>
+                                            <p:cond delay="0"/>
+                                          </p:stCondLst>
+                                        </p:cTn>
+                                        <p:tgtEl>
+                                          <p:spTgt spid="3">
+                                            <p:txEl>
+                                              <p:pRg st="3" end="3"/>
+                                            </p:txEl>
+                                          </p:spTgt>
+                                        </p:tgtEl>
+                                        <p:attrNameLst>
+                                          <p:attrName>style.visibility</p:attrName>
+                                        </p:attrNameLst>
+                                      </p:cBhvr>
+                                      <p:to>
+                                        <p:strVal val="visible"/>
+                                      </p:to>
+                                    </p:set>
+                                    <p:animEffect transition="in" filter="wipe(left)">
+                                      <p:cBhvr>
+                                        <p:cTn id="19" dur="1000"/>
+                                        <p:tgtEl>
+                                          <p:spTgt spid="3">
+                                            <p:txEl>
+                                              <p:pRg st="3" end="3"/>
+                                            </p:txEl>
+                                          </p:spTgt>
+                                        </p:tgtEl>
+                                      </p:cBhvr>
+                                    </p:animEffect>
+                                  </p:childTnLst>
+                                </p:cTn>
+                              </p:par>
+                            </p:childTnLst>
+                          </p:cTn>
+                        </p:par>
+                      </p:childTnLst>
+                    </p:cTn>
+                  </p:par>
+                  <p:par>
+                    <p:cTn id="20" fill="hold">
+                      <p:stCondLst>
+                        <p:cond delay="indefinite"/>
+                      </p:stCondLst>
+                      <p:childTnLst>
+                        <p:par>
+                          <p:cTn id="21" fill="hold">
+                            <p:stCondLst>
+                              <p:cond delay="0"/>
+                            </p:stCondLst>
+                            <p:childTnLst>
+                              <p:par>
+                                <p:cTn id="22" presetID="23" presetClass="entr" presetSubtype="16" fill="hold" nodeType="clickEffect">
+                                  <p:stCondLst>
+                                    <p:cond delay="0"/>
+                                  </p:stCondLst>
+                                  <p:childTnLst>
+                                    <p:set>
+                                      <p:cBhvr>
+                                        <p:cTn id="23" dur="1" fill="hold">
                                           <p:stCondLst>
                                             <p:cond delay="0"/>
                                           </p:stCondLst>
@@ -17108,7 +17168,7 @@
                                     </p:set>
                                     <p:anim calcmode="lin" valueType="num">
                                       <p:cBhvr>
-                                        <p:cTn id="21" dur="500" fill="hold"/>
+                                        <p:cTn id="24" dur="500" fill="hold"/>
                                         <p:tgtEl>
                                           <p:spTgt spid="5">
                                             <p:txEl>
@@ -17135,7 +17195,7 @@
                                     </p:anim>
                                     <p:anim calcmode="lin" valueType="num">
                                       <p:cBhvr>
-                                        <p:cTn id="22" dur="500" fill="hold"/>
+                                        <p:cTn id="25" dur="500" fill="hold"/>
                                         <p:tgtEl>
                                           <p:spTgt spid="5">
                                             <p:txEl>
@@ -17377,15 +17437,7 @@
                   <a:srgbClr val="0000FF"/>
                 </a:solidFill>
               </a:rPr>
-              <a:t> V(G</a:t>
-            </a:r>
-            <a:r>
-              <a:rPr lang="en-US" sz="5400" dirty="0" smtClean="0">
-                <a:solidFill>
-                  <a:srgbClr val="0000FF"/>
-                </a:solidFill>
-              </a:rPr>
-              <a:t>)</a:t>
+              <a:t> V(G)</a:t>
             </a:r>
           </a:p>
           <a:p>
@@ -17687,1240 +17739,6 @@
 </file>
 
 <file path=ppt/slides/slide20.xml><?xml version="1.0" encoding="utf-8"?>
-<p:sld xmlns:a="http://schemas.openxmlformats.org/drawingml/2006/main" xmlns:r="http://schemas.openxmlformats.org/officeDocument/2006/relationships" xmlns:p="http://schemas.openxmlformats.org/presentationml/2006/main">
-  <p:cSld>
-    <p:spTree>
-      <p:nvGrpSpPr>
-        <p:cNvPr id="1" name=""/>
-        <p:cNvGrpSpPr/>
-        <p:nvPr/>
-      </p:nvGrpSpPr>
-      <p:grpSpPr>
-        <a:xfrm>
-          <a:off x="0" y="0"/>
-          <a:ext cx="0" cy="0"/>
-          <a:chOff x="0" y="0"/>
-          <a:chExt cx="0" cy="0"/>
-        </a:xfrm>
-      </p:grpSpPr>
-      <p:sp>
-        <p:nvSpPr>
-          <p:cNvPr id="2" name="Title 1"/>
-          <p:cNvSpPr>
-            <a:spLocks noGrp="1"/>
-          </p:cNvSpPr>
-          <p:nvPr>
-            <p:ph type="title"/>
-          </p:nvPr>
-        </p:nvSpPr>
-        <p:spPr/>
-        <p:txBody>
-          <a:bodyPr/>
-          <a:lstStyle/>
-          <a:p>
-            <a:r>
-              <a:rPr lang="en-US" dirty="0" smtClean="0"/>
-              <a:t>Corollary</a:t>
-            </a:r>
-            <a:endParaRPr lang="en-US" dirty="0"/>
-          </a:p>
-        </p:txBody>
-      </p:sp>
-      <p:sp>
-        <p:nvSpPr>
-          <p:cNvPr id="3" name="Content Placeholder 2"/>
-          <p:cNvSpPr>
-            <a:spLocks noGrp="1"/>
-          </p:cNvSpPr>
-          <p:nvPr>
-            <p:ph idx="1"/>
-          </p:nvPr>
-        </p:nvSpPr>
-        <p:spPr>
-          <a:xfrm>
-            <a:off x="381000" y="1143000"/>
-            <a:ext cx="8763000" cy="2057400"/>
-          </a:xfrm>
-        </p:spPr>
-        <p:txBody>
-          <a:bodyPr/>
-          <a:lstStyle/>
-          <a:p>
-            <a:pPr>
-              <a:lnSpc>
-                <a:spcPct val="80000"/>
-              </a:lnSpc>
-            </a:pPr>
-            <a:r>
-              <a:rPr lang="en-US" sz="4400" dirty="0" smtClean="0"/>
-              <a:t>     MST </a:t>
-            </a:r>
-            <a:r>
-              <a:rPr lang="en-US" sz="4400" dirty="0">
-                <a:solidFill>
-                  <a:schemeClr val="accent1">
-                    <a:lumMod val="50000"/>
-                  </a:schemeClr>
-                </a:solidFill>
-              </a:rPr>
-              <a:t>C</a:t>
-            </a:r>
-            <a:r>
-              <a:rPr lang="en-US" sz="4400" dirty="0"/>
-              <a:t> is </a:t>
-            </a:r>
-            <a:r>
-              <a:rPr lang="en-US" sz="4400" dirty="0" smtClean="0"/>
-              <a:t>unique i</a:t>
-            </a:r>
-            <a:r>
-              <a:rPr lang="en-US" sz="4400" dirty="0" smtClean="0"/>
-              <a:t>f all weights </a:t>
-            </a:r>
-          </a:p>
-          <a:p>
-            <a:pPr>
-              <a:lnSpc>
-                <a:spcPct val="80000"/>
-              </a:lnSpc>
-            </a:pPr>
-            <a:r>
-              <a:rPr lang="en-US" sz="4400" dirty="0" smtClean="0"/>
-              <a:t>differ:</a:t>
-            </a:r>
-          </a:p>
-        </p:txBody>
-      </p:sp>
-      <p:sp>
-        <p:nvSpPr>
-          <p:cNvPr id="4" name="Slide Number Placeholder 3"/>
-          <p:cNvSpPr>
-            <a:spLocks noGrp="1"/>
-          </p:cNvSpPr>
-          <p:nvPr>
-            <p:ph type="sldNum" sz="quarter" idx="4"/>
-          </p:nvPr>
-        </p:nvSpPr>
-        <p:spPr/>
-        <p:txBody>
-          <a:bodyPr/>
-          <a:lstStyle/>
-          <a:p>
-            <a:pPr>
-              <a:defRPr/>
-            </a:pPr>
-            <a:r>
-              <a:rPr lang="en-US" smtClean="0"/>
-              <a:t>connected.</a:t>
-            </a:r>
-            <a:fld id="{D7F2FC53-1536-41A9-A9C1-2199CF803E30}" type="slidenum">
-              <a:rPr lang="en-US" smtClean="0"/>
-              <a:pPr>
-                <a:defRPr/>
-              </a:pPr>
-              <a:t>20</a:t>
-            </a:fld>
-            <a:endParaRPr lang="en-US" dirty="0"/>
-          </a:p>
-        </p:txBody>
-      </p:sp>
-      <p:sp>
-        <p:nvSpPr>
-          <p:cNvPr id="6" name="TextBox 5"/>
-          <p:cNvSpPr txBox="1"/>
-          <p:nvPr/>
-        </p:nvSpPr>
-        <p:spPr>
-          <a:xfrm>
-            <a:off x="381000" y="1676400"/>
-            <a:ext cx="8534400" cy="3477875"/>
-          </a:xfrm>
-          <a:prstGeom prst="rect">
-            <a:avLst/>
-          </a:prstGeom>
-          <a:noFill/>
-        </p:spPr>
-        <p:txBody>
-          <a:bodyPr wrap="square" rtlCol="0">
-            <a:spAutoFit/>
-          </a:bodyPr>
-          <a:lstStyle/>
-          <a:p>
-            <a:r>
-              <a:rPr lang="en-US" sz="4400" dirty="0" smtClean="0"/>
-              <a:t>            if </a:t>
-            </a:r>
-            <a:r>
-              <a:rPr lang="en-US" sz="4400" dirty="0" smtClean="0">
-                <a:solidFill>
-                  <a:schemeClr val="accent1">
-                    <a:lumMod val="50000"/>
-                  </a:schemeClr>
-                </a:solidFill>
-              </a:rPr>
-              <a:t>e </a:t>
-            </a:r>
-            <a:r>
-              <a:rPr lang="en-US" sz="4400" dirty="0" smtClean="0"/>
-              <a:t>not a </a:t>
-            </a:r>
-            <a:r>
-              <a:rPr lang="en-US" sz="4400" dirty="0" smtClean="0">
-                <a:solidFill>
-                  <a:srgbClr val="0000E5"/>
-                </a:solidFill>
-              </a:rPr>
-              <a:t>C</a:t>
-            </a:r>
-            <a:r>
-              <a:rPr lang="en-US" sz="4400" dirty="0" smtClean="0"/>
-              <a:t>-edge then</a:t>
-            </a:r>
-          </a:p>
-          <a:p>
-            <a:pPr algn="ctr"/>
-            <a:r>
-              <a:rPr lang="en-US" sz="4400" dirty="0" smtClean="0">
-                <a:solidFill>
-                  <a:srgbClr val="0000E5"/>
-                </a:solidFill>
-                <a:latin typeface="Comic Sans MS"/>
-                <a:cs typeface="Comic Sans MS"/>
-              </a:rPr>
-              <a:t>w</a:t>
-            </a:r>
-            <a:r>
-              <a:rPr lang="en-US" sz="4400" dirty="0">
-                <a:solidFill>
-                  <a:srgbClr val="0000E5"/>
-                </a:solidFill>
-                <a:latin typeface="Comic Sans MS"/>
-                <a:cs typeface="Comic Sans MS"/>
-              </a:rPr>
-              <a:t>(e) </a:t>
-            </a:r>
-            <a:r>
-              <a:rPr lang="en-US" sz="4400" b="1" dirty="0" smtClean="0">
-                <a:solidFill>
-                  <a:srgbClr val="0000E5"/>
-                </a:solidFill>
-                <a:latin typeface="Euclid Symbol" charset="2"/>
-                <a:cs typeface="Euclid Symbol" charset="2"/>
-              </a:rPr>
-              <a:t>&lt; </a:t>
-            </a:r>
-            <a:r>
-              <a:rPr lang="en-US" sz="4400" dirty="0">
-                <a:solidFill>
-                  <a:srgbClr val="0000E5"/>
-                </a:solidFill>
-                <a:latin typeface="Comic Sans MS"/>
-                <a:cs typeface="Comic Sans MS"/>
-              </a:rPr>
-              <a:t>w(g</a:t>
-            </a:r>
-            <a:r>
-              <a:rPr lang="en-US" sz="4400" dirty="0" smtClean="0">
-                <a:solidFill>
-                  <a:srgbClr val="0000E5"/>
-                </a:solidFill>
-                <a:latin typeface="Comic Sans MS"/>
-                <a:cs typeface="Comic Sans MS"/>
-              </a:rPr>
-              <a:t>)</a:t>
-            </a:r>
-            <a:endParaRPr lang="en-US" sz="4400" dirty="0">
-              <a:latin typeface="Comic Sans MS"/>
-              <a:cs typeface="Comic Sans MS"/>
-            </a:endParaRPr>
-          </a:p>
-          <a:p>
-            <a:pPr algn="ctr"/>
-            <a:r>
-              <a:rPr lang="en-US" sz="4400" dirty="0">
-                <a:latin typeface="Comic Sans MS"/>
-                <a:cs typeface="Comic Sans MS"/>
-              </a:rPr>
-              <a:t> </a:t>
-            </a:r>
-            <a:r>
-              <a:rPr lang="en-US" sz="4400" dirty="0">
-                <a:solidFill>
-                  <a:schemeClr val="accent1">
-                    <a:lumMod val="50000"/>
-                  </a:schemeClr>
-                </a:solidFill>
-                <a:latin typeface="Comic Sans MS"/>
-                <a:cs typeface="Comic Sans MS"/>
-              </a:rPr>
-              <a:t>w</a:t>
-            </a:r>
-            <a:r>
-              <a:rPr lang="en-US" sz="4400" dirty="0" smtClean="0">
-                <a:solidFill>
-                  <a:schemeClr val="accent1">
-                    <a:lumMod val="50000"/>
-                  </a:schemeClr>
-                </a:solidFill>
-                <a:latin typeface="Comic Sans MS"/>
-                <a:cs typeface="Comic Sans MS"/>
-              </a:rPr>
-              <a:t>(</a:t>
-            </a:r>
-            <a:r>
-              <a:rPr lang="en-US" sz="4400" dirty="0">
-                <a:solidFill>
-                  <a:srgbClr val="008000"/>
-                </a:solidFill>
-                <a:latin typeface="Comic Sans MS"/>
-                <a:cs typeface="Comic Sans MS"/>
-              </a:rPr>
-              <a:t>D</a:t>
-            </a:r>
-            <a:r>
-              <a:rPr lang="en-US" sz="4400" dirty="0" smtClean="0">
-                <a:solidFill>
-                  <a:schemeClr val="accent1">
-                    <a:lumMod val="50000"/>
-                  </a:schemeClr>
-                </a:solidFill>
-                <a:latin typeface="Comic Sans MS"/>
-                <a:cs typeface="Comic Sans MS"/>
-              </a:rPr>
-              <a:t>) </a:t>
-            </a:r>
-            <a:r>
-              <a:rPr lang="en-US" sz="4400" b="1" dirty="0" smtClean="0">
-                <a:solidFill>
-                  <a:srgbClr val="0000E5"/>
-                </a:solidFill>
-                <a:latin typeface="Euclid Symbol" charset="2"/>
-                <a:cs typeface="Euclid Symbol" charset="2"/>
-              </a:rPr>
-              <a:t>&lt; </a:t>
-            </a:r>
-            <a:r>
-              <a:rPr lang="en-US" sz="4400" dirty="0">
-                <a:solidFill>
-                  <a:srgbClr val="0000E5"/>
-                </a:solidFill>
-                <a:latin typeface="Comic Sans MS"/>
-                <a:cs typeface="Comic Sans MS"/>
-              </a:rPr>
-              <a:t>w</a:t>
-            </a:r>
-            <a:r>
-              <a:rPr lang="en-US" sz="4400" dirty="0" smtClean="0">
-                <a:solidFill>
-                  <a:srgbClr val="0000E5"/>
-                </a:solidFill>
-                <a:latin typeface="Comic Sans MS"/>
-                <a:cs typeface="Comic Sans MS"/>
-              </a:rPr>
-              <a:t>(C)</a:t>
-            </a:r>
-            <a:endParaRPr lang="en-US" sz="4400" dirty="0" smtClean="0">
-              <a:solidFill>
-                <a:srgbClr val="0000E5"/>
-              </a:solidFill>
-              <a:latin typeface="Comic Sans MS"/>
-              <a:cs typeface="Comic Sans MS"/>
-            </a:endParaRPr>
-          </a:p>
-          <a:p>
-            <a:r>
-              <a:rPr lang="en-US" sz="4400" dirty="0" smtClean="0">
-                <a:latin typeface="Comic Sans MS"/>
-                <a:cs typeface="Comic Sans MS"/>
-              </a:rPr>
-              <a:t>contradicting min weight for</a:t>
-            </a:r>
-            <a:r>
-              <a:rPr lang="en-US" sz="4400" dirty="0" smtClean="0">
-                <a:solidFill>
-                  <a:srgbClr val="0000E5"/>
-                </a:solidFill>
-                <a:latin typeface="Comic Sans MS"/>
-                <a:cs typeface="Comic Sans MS"/>
-              </a:rPr>
-              <a:t> </a:t>
-            </a:r>
-            <a:r>
-              <a:rPr lang="en-US" sz="4400" dirty="0" smtClean="0">
-                <a:solidFill>
-                  <a:srgbClr val="0000E5"/>
-                </a:solidFill>
-                <a:latin typeface="Comic Sans MS"/>
-                <a:cs typeface="Comic Sans MS"/>
-              </a:rPr>
-              <a:t>C</a:t>
-            </a:r>
-            <a:r>
-              <a:rPr lang="en-US" sz="4400" dirty="0" smtClean="0">
-                <a:latin typeface="Comic Sans MS"/>
-                <a:cs typeface="Comic Sans MS"/>
-              </a:rPr>
-              <a:t>.</a:t>
-            </a:r>
-          </a:p>
-          <a:p>
-            <a:r>
-              <a:rPr lang="en-US" sz="4400" dirty="0" smtClean="0">
-                <a:latin typeface="Comic Sans MS"/>
-                <a:cs typeface="Comic Sans MS"/>
-              </a:rPr>
-              <a:t>So only </a:t>
-            </a:r>
-            <a:r>
-              <a:rPr lang="en-US" sz="4400" dirty="0" smtClean="0">
-                <a:solidFill>
-                  <a:srgbClr val="930093"/>
-                </a:solidFill>
-                <a:latin typeface="Comic Sans MS"/>
-                <a:cs typeface="Comic Sans MS"/>
-              </a:rPr>
-              <a:t>Case 1</a:t>
-            </a:r>
-            <a:r>
-              <a:rPr lang="en-US" sz="4400" dirty="0" smtClean="0">
-                <a:latin typeface="Comic Sans MS"/>
-                <a:cs typeface="Comic Sans MS"/>
-              </a:rPr>
-              <a:t> is possible:</a:t>
-            </a:r>
-          </a:p>
-        </p:txBody>
-      </p:sp>
-    </p:spTree>
-    <p:extLst>
-      <p:ext uri="{BB962C8B-B14F-4D97-AF65-F5344CB8AC3E}">
-        <p14:creationId xmlns:p14="http://schemas.microsoft.com/office/powerpoint/2010/main" val="3475477639"/>
-      </p:ext>
-    </p:extLst>
-  </p:cSld>
-  <p:clrMapOvr>
-    <a:masterClrMapping/>
-  </p:clrMapOvr>
-  <p:transition xmlns:p14="http://schemas.microsoft.com/office/powerpoint/2010/main" spd="slow" advClick="0">
-    <p:fade thruBlk="1"/>
-  </p:transition>
-  <p:timing>
-    <p:tnLst>
-      <p:par>
-        <p:cTn xmlns:p14="http://schemas.microsoft.com/office/powerpoint/2010/main" id="1" dur="indefinite" restart="never" nodeType="tmRoot">
-          <p:childTnLst>
-            <p:seq concurrent="1" nextAc="seek">
-              <p:cTn id="2" dur="indefinite" nodeType="mainSeq">
-                <p:childTnLst>
-                  <p:par>
-                    <p:cTn id="3" fill="hold">
-                      <p:stCondLst>
-                        <p:cond delay="indefinite"/>
-                      </p:stCondLst>
-                      <p:childTnLst>
-                        <p:par>
-                          <p:cTn id="4" fill="hold">
-                            <p:stCondLst>
-                              <p:cond delay="0"/>
-                            </p:stCondLst>
-                            <p:childTnLst>
-                              <p:par>
-                                <p:cTn id="5" presetID="10" presetClass="entr" presetSubtype="0" fill="hold" grpId="0" nodeType="clickEffect">
-                                  <p:stCondLst>
-                                    <p:cond delay="0"/>
-                                  </p:stCondLst>
-                                  <p:childTnLst>
-                                    <p:set>
-                                      <p:cBhvr>
-                                        <p:cTn id="6" dur="1" fill="hold">
-                                          <p:stCondLst>
-                                            <p:cond delay="0"/>
-                                          </p:stCondLst>
-                                        </p:cTn>
-                                        <p:tgtEl>
-                                          <p:spTgt spid="6">
-                                            <p:txEl>
-                                              <p:pRg st="0" end="0"/>
-                                            </p:txEl>
-                                          </p:spTgt>
-                                        </p:tgtEl>
-                                        <p:attrNameLst>
-                                          <p:attrName>style.visibility</p:attrName>
-                                        </p:attrNameLst>
-                                      </p:cBhvr>
-                                      <p:to>
-                                        <p:strVal val="visible"/>
-                                      </p:to>
-                                    </p:set>
-                                    <p:animEffect transition="in" filter="fade">
-                                      <p:cBhvr>
-                                        <p:cTn id="7" dur="500"/>
-                                        <p:tgtEl>
-                                          <p:spTgt spid="6">
-                                            <p:txEl>
-                                              <p:pRg st="0" end="0"/>
-                                            </p:txEl>
-                                          </p:spTgt>
-                                        </p:tgtEl>
-                                      </p:cBhvr>
-                                    </p:animEffect>
-                                  </p:childTnLst>
-                                </p:cTn>
-                              </p:par>
-                            </p:childTnLst>
-                          </p:cTn>
-                        </p:par>
-                      </p:childTnLst>
-                    </p:cTn>
-                  </p:par>
-                  <p:par>
-                    <p:cTn id="8" fill="hold">
-                      <p:stCondLst>
-                        <p:cond delay="indefinite"/>
-                      </p:stCondLst>
-                      <p:childTnLst>
-                        <p:par>
-                          <p:cTn id="9" fill="hold">
-                            <p:stCondLst>
-                              <p:cond delay="0"/>
-                            </p:stCondLst>
-                            <p:childTnLst>
-                              <p:par>
-                                <p:cTn id="10" presetID="22" presetClass="entr" presetSubtype="8" fill="hold" grpId="0" nodeType="clickEffect">
-                                  <p:stCondLst>
-                                    <p:cond delay="0"/>
-                                  </p:stCondLst>
-                                  <p:childTnLst>
-                                    <p:set>
-                                      <p:cBhvr>
-                                        <p:cTn id="11" dur="1" fill="hold">
-                                          <p:stCondLst>
-                                            <p:cond delay="0"/>
-                                          </p:stCondLst>
-                                        </p:cTn>
-                                        <p:tgtEl>
-                                          <p:spTgt spid="6">
-                                            <p:txEl>
-                                              <p:pRg st="1" end="1"/>
-                                            </p:txEl>
-                                          </p:spTgt>
-                                        </p:tgtEl>
-                                        <p:attrNameLst>
-                                          <p:attrName>style.visibility</p:attrName>
-                                        </p:attrNameLst>
-                                      </p:cBhvr>
-                                      <p:to>
-                                        <p:strVal val="visible"/>
-                                      </p:to>
-                                    </p:set>
-                                    <p:animEffect transition="in" filter="wipe(left)">
-                                      <p:cBhvr>
-                                        <p:cTn id="12" dur="1000"/>
-                                        <p:tgtEl>
-                                          <p:spTgt spid="6">
-                                            <p:txEl>
-                                              <p:pRg st="1" end="1"/>
-                                            </p:txEl>
-                                          </p:spTgt>
-                                        </p:tgtEl>
-                                      </p:cBhvr>
-                                    </p:animEffect>
-                                  </p:childTnLst>
-                                </p:cTn>
-                              </p:par>
-                            </p:childTnLst>
-                          </p:cTn>
-                        </p:par>
-                      </p:childTnLst>
-                    </p:cTn>
-                  </p:par>
-                  <p:par>
-                    <p:cTn id="13" fill="hold">
-                      <p:stCondLst>
-                        <p:cond delay="indefinite"/>
-                      </p:stCondLst>
-                      <p:childTnLst>
-                        <p:par>
-                          <p:cTn id="14" fill="hold">
-                            <p:stCondLst>
-                              <p:cond delay="0"/>
-                            </p:stCondLst>
-                            <p:childTnLst>
-                              <p:par>
-                                <p:cTn id="15" presetID="22" presetClass="entr" presetSubtype="8" fill="hold" grpId="0" nodeType="clickEffect">
-                                  <p:stCondLst>
-                                    <p:cond delay="0"/>
-                                  </p:stCondLst>
-                                  <p:childTnLst>
-                                    <p:set>
-                                      <p:cBhvr>
-                                        <p:cTn id="16" dur="1" fill="hold">
-                                          <p:stCondLst>
-                                            <p:cond delay="0"/>
-                                          </p:stCondLst>
-                                        </p:cTn>
-                                        <p:tgtEl>
-                                          <p:spTgt spid="6">
-                                            <p:txEl>
-                                              <p:pRg st="2" end="2"/>
-                                            </p:txEl>
-                                          </p:spTgt>
-                                        </p:tgtEl>
-                                        <p:attrNameLst>
-                                          <p:attrName>style.visibility</p:attrName>
-                                        </p:attrNameLst>
-                                      </p:cBhvr>
-                                      <p:to>
-                                        <p:strVal val="visible"/>
-                                      </p:to>
-                                    </p:set>
-                                    <p:animEffect transition="in" filter="wipe(left)">
-                                      <p:cBhvr>
-                                        <p:cTn id="17" dur="1000"/>
-                                        <p:tgtEl>
-                                          <p:spTgt spid="6">
-                                            <p:txEl>
-                                              <p:pRg st="2" end="2"/>
-                                            </p:txEl>
-                                          </p:spTgt>
-                                        </p:tgtEl>
-                                      </p:cBhvr>
-                                    </p:animEffect>
-                                  </p:childTnLst>
-                                </p:cTn>
-                              </p:par>
-                            </p:childTnLst>
-                          </p:cTn>
-                        </p:par>
-                      </p:childTnLst>
-                    </p:cTn>
-                  </p:par>
-                  <p:par>
-                    <p:cTn id="18" fill="hold">
-                      <p:stCondLst>
-                        <p:cond delay="indefinite"/>
-                      </p:stCondLst>
-                      <p:childTnLst>
-                        <p:par>
-                          <p:cTn id="19" fill="hold">
-                            <p:stCondLst>
-                              <p:cond delay="0"/>
-                            </p:stCondLst>
-                            <p:childTnLst>
-                              <p:par>
-                                <p:cTn id="20" presetID="10" presetClass="entr" presetSubtype="0" fill="hold" grpId="0" nodeType="clickEffect">
-                                  <p:stCondLst>
-                                    <p:cond delay="0"/>
-                                  </p:stCondLst>
-                                  <p:childTnLst>
-                                    <p:set>
-                                      <p:cBhvr>
-                                        <p:cTn id="21" dur="1" fill="hold">
-                                          <p:stCondLst>
-                                            <p:cond delay="0"/>
-                                          </p:stCondLst>
-                                        </p:cTn>
-                                        <p:tgtEl>
-                                          <p:spTgt spid="6">
-                                            <p:txEl>
-                                              <p:pRg st="3" end="3"/>
-                                            </p:txEl>
-                                          </p:spTgt>
-                                        </p:tgtEl>
-                                        <p:attrNameLst>
-                                          <p:attrName>style.visibility</p:attrName>
-                                        </p:attrNameLst>
-                                      </p:cBhvr>
-                                      <p:to>
-                                        <p:strVal val="visible"/>
-                                      </p:to>
-                                    </p:set>
-                                    <p:animEffect transition="in" filter="fade">
-                                      <p:cBhvr>
-                                        <p:cTn id="22" dur="500"/>
-                                        <p:tgtEl>
-                                          <p:spTgt spid="6">
-                                            <p:txEl>
-                                              <p:pRg st="3" end="3"/>
-                                            </p:txEl>
-                                          </p:spTgt>
-                                        </p:tgtEl>
-                                      </p:cBhvr>
-                                    </p:animEffect>
-                                  </p:childTnLst>
-                                </p:cTn>
-                              </p:par>
-                            </p:childTnLst>
-                          </p:cTn>
-                        </p:par>
-                      </p:childTnLst>
-                    </p:cTn>
-                  </p:par>
-                  <p:par>
-                    <p:cTn id="23" fill="hold">
-                      <p:stCondLst>
-                        <p:cond delay="indefinite"/>
-                      </p:stCondLst>
-                      <p:childTnLst>
-                        <p:par>
-                          <p:cTn id="24" fill="hold">
-                            <p:stCondLst>
-                              <p:cond delay="0"/>
-                            </p:stCondLst>
-                            <p:childTnLst>
-                              <p:par>
-                                <p:cTn id="25" presetID="10" presetClass="entr" presetSubtype="0" fill="hold" grpId="0" nodeType="clickEffect">
-                                  <p:stCondLst>
-                                    <p:cond delay="0"/>
-                                  </p:stCondLst>
-                                  <p:childTnLst>
-                                    <p:set>
-                                      <p:cBhvr>
-                                        <p:cTn id="26" dur="1" fill="hold">
-                                          <p:stCondLst>
-                                            <p:cond delay="0"/>
-                                          </p:stCondLst>
-                                        </p:cTn>
-                                        <p:tgtEl>
-                                          <p:spTgt spid="6">
-                                            <p:txEl>
-                                              <p:pRg st="4" end="4"/>
-                                            </p:txEl>
-                                          </p:spTgt>
-                                        </p:tgtEl>
-                                        <p:attrNameLst>
-                                          <p:attrName>style.visibility</p:attrName>
-                                        </p:attrNameLst>
-                                      </p:cBhvr>
-                                      <p:to>
-                                        <p:strVal val="visible"/>
-                                      </p:to>
-                                    </p:set>
-                                    <p:animEffect transition="in" filter="fade">
-                                      <p:cBhvr>
-                                        <p:cTn id="27" dur="500"/>
-                                        <p:tgtEl>
-                                          <p:spTgt spid="6">
-                                            <p:txEl>
-                                              <p:pRg st="4" end="4"/>
-                                            </p:txEl>
-                                          </p:spTgt>
-                                        </p:tgtEl>
-                                      </p:cBhvr>
-                                    </p:animEffect>
-                                  </p:childTnLst>
-                                </p:cTn>
-                              </p:par>
-                            </p:childTnLst>
-                          </p:cTn>
-                        </p:par>
-                      </p:childTnLst>
-                    </p:cTn>
-                  </p:par>
-                </p:childTnLst>
-              </p:cTn>
-              <p:prevCondLst>
-                <p:cond evt="onPrev" delay="0">
-                  <p:tgtEl>
-                    <p:sldTgt/>
-                  </p:tgtEl>
-                </p:cond>
-              </p:prevCondLst>
-              <p:nextCondLst>
-                <p:cond evt="onNext" delay="0">
-                  <p:tgtEl>
-                    <p:sldTgt/>
-                  </p:tgtEl>
-                </p:cond>
-              </p:nextCondLst>
-            </p:seq>
-          </p:childTnLst>
-        </p:cTn>
-      </p:par>
-    </p:tnLst>
-    <p:bldLst>
-      <p:bldP spid="6" grpId="0" build="p"/>
-    </p:bldLst>
-  </p:timing>
-</p:sld>
-</file>
-
-<file path=ppt/slides/slide21.xml><?xml version="1.0" encoding="utf-8"?>
-<p:sld xmlns:a="http://schemas.openxmlformats.org/drawingml/2006/main" xmlns:r="http://schemas.openxmlformats.org/officeDocument/2006/relationships" xmlns:p="http://schemas.openxmlformats.org/presentationml/2006/main">
-  <p:cSld>
-    <p:spTree>
-      <p:nvGrpSpPr>
-        <p:cNvPr id="1" name=""/>
-        <p:cNvGrpSpPr/>
-        <p:nvPr/>
-      </p:nvGrpSpPr>
-      <p:grpSpPr>
-        <a:xfrm>
-          <a:off x="0" y="0"/>
-          <a:ext cx="0" cy="0"/>
-          <a:chOff x="0" y="0"/>
-          <a:chExt cx="0" cy="0"/>
-        </a:xfrm>
-      </p:grpSpPr>
-      <p:sp>
-        <p:nvSpPr>
-          <p:cNvPr id="2" name="Title 1"/>
-          <p:cNvSpPr>
-            <a:spLocks noGrp="1"/>
-          </p:cNvSpPr>
-          <p:nvPr>
-            <p:ph type="title"/>
-          </p:nvPr>
-        </p:nvSpPr>
-        <p:spPr/>
-        <p:txBody>
-          <a:bodyPr/>
-          <a:lstStyle/>
-          <a:p>
-            <a:r>
-              <a:rPr lang="en-US" dirty="0" smtClean="0"/>
-              <a:t>Corollary</a:t>
-            </a:r>
-            <a:endParaRPr lang="en-US" dirty="0"/>
-          </a:p>
-        </p:txBody>
-      </p:sp>
-      <p:sp>
-        <p:nvSpPr>
-          <p:cNvPr id="3" name="Content Placeholder 2"/>
-          <p:cNvSpPr>
-            <a:spLocks noGrp="1"/>
-          </p:cNvSpPr>
-          <p:nvPr>
-            <p:ph idx="1"/>
-          </p:nvPr>
-        </p:nvSpPr>
-        <p:spPr>
-          <a:xfrm>
-            <a:off x="381000" y="1143000"/>
-            <a:ext cx="8763000" cy="2057400"/>
-          </a:xfrm>
-        </p:spPr>
-        <p:txBody>
-          <a:bodyPr/>
-          <a:lstStyle/>
-          <a:p>
-            <a:pPr>
-              <a:lnSpc>
-                <a:spcPct val="80000"/>
-              </a:lnSpc>
-            </a:pPr>
-            <a:r>
-              <a:rPr lang="en-US" sz="4400" dirty="0" smtClean="0"/>
-              <a:t>     MST </a:t>
-            </a:r>
-            <a:r>
-              <a:rPr lang="en-US" sz="4400" dirty="0">
-                <a:solidFill>
-                  <a:schemeClr val="accent1">
-                    <a:lumMod val="50000"/>
-                  </a:schemeClr>
-                </a:solidFill>
-              </a:rPr>
-              <a:t>C</a:t>
-            </a:r>
-            <a:r>
-              <a:rPr lang="en-US" sz="4400" dirty="0"/>
-              <a:t> is </a:t>
-            </a:r>
-            <a:r>
-              <a:rPr lang="en-US" sz="4400" dirty="0" smtClean="0"/>
-              <a:t>unique i</a:t>
-            </a:r>
-            <a:r>
-              <a:rPr lang="en-US" sz="4400" dirty="0" smtClean="0"/>
-              <a:t>f all weights </a:t>
-            </a:r>
-          </a:p>
-          <a:p>
-            <a:pPr>
-              <a:lnSpc>
-                <a:spcPct val="80000"/>
-              </a:lnSpc>
-            </a:pPr>
-            <a:r>
-              <a:rPr lang="en-US" sz="4400" dirty="0" smtClean="0"/>
-              <a:t>differ:</a:t>
-            </a:r>
-          </a:p>
-        </p:txBody>
-      </p:sp>
-      <p:sp>
-        <p:nvSpPr>
-          <p:cNvPr id="4" name="Slide Number Placeholder 3"/>
-          <p:cNvSpPr>
-            <a:spLocks noGrp="1"/>
-          </p:cNvSpPr>
-          <p:nvPr>
-            <p:ph type="sldNum" sz="quarter" idx="4"/>
-          </p:nvPr>
-        </p:nvSpPr>
-        <p:spPr/>
-        <p:txBody>
-          <a:bodyPr/>
-          <a:lstStyle/>
-          <a:p>
-            <a:pPr>
-              <a:defRPr/>
-            </a:pPr>
-            <a:r>
-              <a:rPr lang="en-US" smtClean="0"/>
-              <a:t>connected.</a:t>
-            </a:r>
-            <a:fld id="{D7F2FC53-1536-41A9-A9C1-2199CF803E30}" type="slidenum">
-              <a:rPr lang="en-US" smtClean="0"/>
-              <a:pPr>
-                <a:defRPr/>
-              </a:pPr>
-              <a:t>21</a:t>
-            </a:fld>
-            <a:endParaRPr lang="en-US" dirty="0"/>
-          </a:p>
-        </p:txBody>
-      </p:sp>
-      <p:sp>
-        <p:nvSpPr>
-          <p:cNvPr id="6" name="TextBox 5"/>
-          <p:cNvSpPr txBox="1"/>
-          <p:nvPr/>
-        </p:nvSpPr>
-        <p:spPr>
-          <a:xfrm>
-            <a:off x="381000" y="1676400"/>
-            <a:ext cx="8534400" cy="2800767"/>
-          </a:xfrm>
-          <a:prstGeom prst="rect">
-            <a:avLst/>
-          </a:prstGeom>
-          <a:noFill/>
-        </p:spPr>
-        <p:txBody>
-          <a:bodyPr wrap="square" rtlCol="0">
-            <a:spAutoFit/>
-          </a:bodyPr>
-          <a:lstStyle/>
-          <a:p>
-            <a:r>
-              <a:rPr lang="en-US" sz="4400" dirty="0" smtClean="0"/>
-              <a:t>            if </a:t>
-            </a:r>
-            <a:r>
-              <a:rPr lang="en-US" sz="4400" dirty="0" smtClean="0">
-                <a:solidFill>
-                  <a:schemeClr val="accent1">
-                    <a:lumMod val="50000"/>
-                  </a:schemeClr>
-                </a:solidFill>
-              </a:rPr>
-              <a:t>e </a:t>
-            </a:r>
-            <a:r>
-              <a:rPr lang="en-US" sz="4400" dirty="0" smtClean="0"/>
-              <a:t>not a </a:t>
-            </a:r>
-            <a:r>
-              <a:rPr lang="en-US" sz="4400" dirty="0" smtClean="0">
-                <a:solidFill>
-                  <a:srgbClr val="0000E5"/>
-                </a:solidFill>
-              </a:rPr>
-              <a:t>C</a:t>
-            </a:r>
-            <a:r>
-              <a:rPr lang="en-US" sz="4400" dirty="0" smtClean="0"/>
-              <a:t>-edge then</a:t>
-            </a:r>
-          </a:p>
-          <a:p>
-            <a:pPr algn="ctr"/>
-            <a:r>
-              <a:rPr lang="en-US" sz="4400" dirty="0" smtClean="0">
-                <a:solidFill>
-                  <a:srgbClr val="0000E5"/>
-                </a:solidFill>
-                <a:latin typeface="Comic Sans MS"/>
-                <a:cs typeface="Comic Sans MS"/>
-              </a:rPr>
-              <a:t>w</a:t>
-            </a:r>
-            <a:r>
-              <a:rPr lang="en-US" sz="4400" dirty="0">
-                <a:solidFill>
-                  <a:srgbClr val="0000E5"/>
-                </a:solidFill>
-                <a:latin typeface="Comic Sans MS"/>
-                <a:cs typeface="Comic Sans MS"/>
-              </a:rPr>
-              <a:t>(e) </a:t>
-            </a:r>
-            <a:r>
-              <a:rPr lang="en-US" sz="4400" b="1" dirty="0" smtClean="0">
-                <a:solidFill>
-                  <a:srgbClr val="0000E5"/>
-                </a:solidFill>
-                <a:latin typeface="Euclid Symbol" charset="2"/>
-                <a:cs typeface="Euclid Symbol" charset="2"/>
-              </a:rPr>
-              <a:t>&lt; </a:t>
-            </a:r>
-            <a:r>
-              <a:rPr lang="en-US" sz="4400" dirty="0">
-                <a:solidFill>
-                  <a:srgbClr val="0000E5"/>
-                </a:solidFill>
-                <a:latin typeface="Comic Sans MS"/>
-                <a:cs typeface="Comic Sans MS"/>
-              </a:rPr>
-              <a:t>w(g</a:t>
-            </a:r>
-            <a:r>
-              <a:rPr lang="en-US" sz="4400" dirty="0" smtClean="0">
-                <a:solidFill>
-                  <a:srgbClr val="0000E5"/>
-                </a:solidFill>
-                <a:latin typeface="Comic Sans MS"/>
-                <a:cs typeface="Comic Sans MS"/>
-              </a:rPr>
-              <a:t>)</a:t>
-            </a:r>
-            <a:endParaRPr lang="en-US" sz="4400" dirty="0">
-              <a:latin typeface="Comic Sans MS"/>
-              <a:cs typeface="Comic Sans MS"/>
-            </a:endParaRPr>
-          </a:p>
-          <a:p>
-            <a:pPr algn="ctr"/>
-            <a:r>
-              <a:rPr lang="en-US" sz="4400" dirty="0">
-                <a:latin typeface="Comic Sans MS"/>
-                <a:cs typeface="Comic Sans MS"/>
-              </a:rPr>
-              <a:t> </a:t>
-            </a:r>
-            <a:r>
-              <a:rPr lang="en-US" sz="4400" dirty="0">
-                <a:solidFill>
-                  <a:schemeClr val="accent1">
-                    <a:lumMod val="50000"/>
-                  </a:schemeClr>
-                </a:solidFill>
-                <a:latin typeface="Comic Sans MS"/>
-                <a:cs typeface="Comic Sans MS"/>
-              </a:rPr>
-              <a:t>w</a:t>
-            </a:r>
-            <a:r>
-              <a:rPr lang="en-US" sz="4400" dirty="0" smtClean="0">
-                <a:solidFill>
-                  <a:schemeClr val="accent1">
-                    <a:lumMod val="50000"/>
-                  </a:schemeClr>
-                </a:solidFill>
-                <a:latin typeface="Comic Sans MS"/>
-                <a:cs typeface="Comic Sans MS"/>
-              </a:rPr>
-              <a:t>(</a:t>
-            </a:r>
-            <a:r>
-              <a:rPr lang="en-US" sz="4400" dirty="0">
-                <a:solidFill>
-                  <a:srgbClr val="008000"/>
-                </a:solidFill>
-                <a:latin typeface="Comic Sans MS"/>
-                <a:cs typeface="Comic Sans MS"/>
-              </a:rPr>
-              <a:t>D</a:t>
-            </a:r>
-            <a:r>
-              <a:rPr lang="en-US" sz="4400" dirty="0" smtClean="0">
-                <a:solidFill>
-                  <a:schemeClr val="accent1">
-                    <a:lumMod val="50000"/>
-                  </a:schemeClr>
-                </a:solidFill>
-                <a:latin typeface="Comic Sans MS"/>
-                <a:cs typeface="Comic Sans MS"/>
-              </a:rPr>
-              <a:t>) </a:t>
-            </a:r>
-            <a:r>
-              <a:rPr lang="en-US" sz="4400" b="1" dirty="0" smtClean="0">
-                <a:solidFill>
-                  <a:srgbClr val="0000E5"/>
-                </a:solidFill>
-                <a:latin typeface="Euclid Symbol" charset="2"/>
-                <a:cs typeface="Euclid Symbol" charset="2"/>
-              </a:rPr>
-              <a:t>&lt; </a:t>
-            </a:r>
-            <a:r>
-              <a:rPr lang="en-US" sz="4400" dirty="0">
-                <a:solidFill>
-                  <a:srgbClr val="0000E5"/>
-                </a:solidFill>
-                <a:latin typeface="Comic Sans MS"/>
-                <a:cs typeface="Comic Sans MS"/>
-              </a:rPr>
-              <a:t>w</a:t>
-            </a:r>
-            <a:r>
-              <a:rPr lang="en-US" sz="4400" dirty="0" smtClean="0">
-                <a:solidFill>
-                  <a:srgbClr val="0000E5"/>
-                </a:solidFill>
-                <a:latin typeface="Comic Sans MS"/>
-                <a:cs typeface="Comic Sans MS"/>
-              </a:rPr>
-              <a:t>(C)</a:t>
-            </a:r>
-            <a:endParaRPr lang="en-US" sz="4400" dirty="0" smtClean="0">
-              <a:solidFill>
-                <a:srgbClr val="0000E5"/>
-              </a:solidFill>
-              <a:latin typeface="Comic Sans MS"/>
-              <a:cs typeface="Comic Sans MS"/>
-            </a:endParaRPr>
-          </a:p>
-          <a:p>
-            <a:r>
-              <a:rPr lang="en-US" sz="4400" dirty="0" smtClean="0">
-                <a:latin typeface="Comic Sans MS"/>
-                <a:cs typeface="Comic Sans MS"/>
-              </a:rPr>
-              <a:t>contradicting min weight for</a:t>
-            </a:r>
-            <a:r>
-              <a:rPr lang="en-US" sz="4400" dirty="0" smtClean="0">
-                <a:solidFill>
-                  <a:srgbClr val="0000E5"/>
-                </a:solidFill>
-                <a:latin typeface="Comic Sans MS"/>
-                <a:cs typeface="Comic Sans MS"/>
-              </a:rPr>
-              <a:t> </a:t>
-            </a:r>
-            <a:r>
-              <a:rPr lang="en-US" sz="4400" dirty="0" smtClean="0">
-                <a:solidFill>
-                  <a:srgbClr val="0000E5"/>
-                </a:solidFill>
-                <a:latin typeface="Comic Sans MS"/>
-                <a:cs typeface="Comic Sans MS"/>
-              </a:rPr>
-              <a:t>C</a:t>
-            </a:r>
-            <a:r>
-              <a:rPr lang="en-US" sz="4400" dirty="0" smtClean="0">
-                <a:latin typeface="Comic Sans MS"/>
-                <a:cs typeface="Comic Sans MS"/>
-              </a:rPr>
-              <a:t>.</a:t>
-            </a:r>
-          </a:p>
-        </p:txBody>
-      </p:sp>
-      <p:sp>
-        <p:nvSpPr>
-          <p:cNvPr id="5" name="Rectangle 4"/>
-          <p:cNvSpPr/>
-          <p:nvPr/>
-        </p:nvSpPr>
-        <p:spPr>
-          <a:xfrm>
-            <a:off x="762000" y="4419600"/>
-            <a:ext cx="7772400" cy="1754327"/>
-          </a:xfrm>
-          <a:prstGeom prst="rect">
-            <a:avLst/>
-          </a:prstGeom>
-        </p:spPr>
-        <p:txBody>
-          <a:bodyPr wrap="square">
-            <a:spAutoFit/>
-          </a:bodyPr>
-          <a:lstStyle/>
-          <a:p>
-            <a:r>
-              <a:rPr lang="en-US" sz="5400" dirty="0" smtClean="0">
-                <a:solidFill>
-                  <a:srgbClr val="930093"/>
-                </a:solidFill>
-                <a:latin typeface="Comic Sans MS"/>
-                <a:cs typeface="Comic Sans MS"/>
-              </a:rPr>
-              <a:t>MST </a:t>
-            </a:r>
-            <a:r>
-              <a:rPr lang="en-US" sz="5400" dirty="0">
-                <a:solidFill>
-                  <a:srgbClr val="930093"/>
-                </a:solidFill>
-                <a:latin typeface="Comic Sans MS"/>
-                <a:cs typeface="Comic Sans MS"/>
-              </a:rPr>
-              <a:t>consists of all the </a:t>
-            </a:r>
-            <a:r>
-              <a:rPr lang="en-US" sz="5400" dirty="0" smtClean="0">
-                <a:solidFill>
-                  <a:srgbClr val="930093"/>
-                </a:solidFill>
-                <a:latin typeface="Comic Sans MS"/>
-                <a:cs typeface="Comic Sans MS"/>
-              </a:rPr>
-              <a:t>min weight </a:t>
-            </a:r>
-            <a:r>
-              <a:rPr lang="en-US" sz="5400" dirty="0">
-                <a:solidFill>
-                  <a:srgbClr val="930093"/>
-                </a:solidFill>
-                <a:latin typeface="Comic Sans MS"/>
-                <a:cs typeface="Comic Sans MS"/>
-              </a:rPr>
-              <a:t>gray edges.</a:t>
-            </a:r>
-          </a:p>
-        </p:txBody>
-      </p:sp>
-    </p:spTree>
-    <p:extLst>
-      <p:ext uri="{BB962C8B-B14F-4D97-AF65-F5344CB8AC3E}">
-        <p14:creationId xmlns:p14="http://schemas.microsoft.com/office/powerpoint/2010/main" val="4242604747"/>
-      </p:ext>
-    </p:extLst>
-  </p:cSld>
-  <p:clrMapOvr>
-    <a:masterClrMapping/>
-  </p:clrMapOvr>
-  <mc:AlternateContent xmlns:mc="http://schemas.openxmlformats.org/markup-compatibility/2006">
-    <mc:Choice xmlns:p14="http://schemas.microsoft.com/office/powerpoint/2010/main" Requires="p14">
-      <p:transition spd="med" p14:dur="700" advClick="0">
-        <p:fade/>
-      </p:transition>
-    </mc:Choice>
-    <mc:Fallback>
-      <p:transition xmlns:p14="http://schemas.microsoft.com/office/powerpoint/2010/main" spd="med" advClick="0">
-        <p:fade/>
-      </p:transition>
-    </mc:Fallback>
-  </mc:AlternateContent>
-  <p:timing>
-    <p:tnLst>
-      <p:par>
-        <p:cTn xmlns:p14="http://schemas.microsoft.com/office/powerpoint/2010/main" id="1" dur="indefinite" restart="never" nodeType="tmRoot"/>
-      </p:par>
-    </p:tnLst>
-  </p:timing>
-</p:sld>
-</file>
-
-<file path=ppt/slides/slide22.xml><?xml version="1.0" encoding="utf-8"?>
 <p:sld xmlns:a="http://schemas.openxmlformats.org/drawingml/2006/main" xmlns:r="http://schemas.openxmlformats.org/officeDocument/2006/relationships" xmlns:p="http://schemas.openxmlformats.org/presentationml/2006/main" show="0">
   <p:cSld>
     <p:spTree>
@@ -19006,7 +17824,7 @@
               <a:pPr>
                 <a:defRPr/>
               </a:pPr>
-              <a:t>22</a:t>
+              <a:t>20</a:t>
             </a:fld>
             <a:endParaRPr lang="en-US" dirty="0"/>
           </a:p>
@@ -19300,7 +18118,7 @@
 </p:sld>
 </file>
 
-<file path=ppt/slides/slide23.xml><?xml version="1.0" encoding="utf-8"?>
+<file path=ppt/slides/slide21.xml><?xml version="1.0" encoding="utf-8"?>
 <p:sld xmlns:a="http://schemas.openxmlformats.org/drawingml/2006/main" xmlns:r="http://schemas.openxmlformats.org/officeDocument/2006/relationships" xmlns:p="http://schemas.openxmlformats.org/presentationml/2006/main" show="0">
   <p:cSld>
     <p:spTree>
@@ -20312,7 +19130,7 @@
               <a:pPr>
                 <a:defRPr/>
               </a:pPr>
-              <a:t>23</a:t>
+              <a:t>21</a:t>
             </a:fld>
             <a:endParaRPr lang="en-US" dirty="0"/>
           </a:p>
@@ -22287,7 +21105,7 @@
 </p:sld>
 </file>
 
-<file path=ppt/slides/slide24.xml><?xml version="1.0" encoding="utf-8"?>
+<file path=ppt/slides/slide22.xml><?xml version="1.0" encoding="utf-8"?>
 <p:sld xmlns:a="http://schemas.openxmlformats.org/drawingml/2006/main" xmlns:r="http://schemas.openxmlformats.org/officeDocument/2006/relationships" xmlns:p="http://schemas.openxmlformats.org/presentationml/2006/main" show="0">
   <p:cSld>
     <p:spTree>
@@ -23299,7 +22117,7 @@
               <a:pPr>
                 <a:defRPr/>
               </a:pPr>
-              <a:t>24</a:t>
+              <a:t>22</a:t>
             </a:fld>
             <a:endParaRPr lang="en-US" dirty="0"/>
           </a:p>
@@ -24993,7 +23811,7 @@
 </p:sld>
 </file>
 
-<file path=ppt/slides/slide25.xml><?xml version="1.0" encoding="utf-8"?>
+<file path=ppt/slides/slide23.xml><?xml version="1.0" encoding="utf-8"?>
 <p:sld xmlns:a="http://schemas.openxmlformats.org/drawingml/2006/main" xmlns:r="http://schemas.openxmlformats.org/officeDocument/2006/relationships" xmlns:p="http://schemas.openxmlformats.org/presentationml/2006/main" show="0">
   <p:cSld>
     <p:spTree>
@@ -25862,7 +24680,7 @@
               <a:pPr>
                 <a:defRPr/>
               </a:pPr>
-              <a:t>25</a:t>
+              <a:t>23</a:t>
             </a:fld>
             <a:endParaRPr lang="en-US" dirty="0"/>
           </a:p>
@@ -27578,7 +26396,7 @@
 </p:sld>
 </file>
 
-<file path=ppt/slides/slide26.xml><?xml version="1.0" encoding="utf-8"?>
+<file path=ppt/slides/slide24.xml><?xml version="1.0" encoding="utf-8"?>
 <p:sld xmlns:a="http://schemas.openxmlformats.org/drawingml/2006/main" xmlns:r="http://schemas.openxmlformats.org/officeDocument/2006/relationships" xmlns:p="http://schemas.openxmlformats.org/presentationml/2006/main" show="0">
   <p:cSld>
     <p:spTree>
@@ -27664,7 +26482,7 @@
               <a:pPr>
                 <a:defRPr/>
               </a:pPr>
-              <a:t>26</a:t>
+              <a:t>24</a:t>
             </a:fld>
             <a:endParaRPr lang="en-US" dirty="0"/>
           </a:p>
@@ -27990,7 +26808,7 @@
 </p:sld>
 </file>
 
-<file path=ppt/slides/slide27.xml><?xml version="1.0" encoding="utf-8"?>
+<file path=ppt/slides/slide25.xml><?xml version="1.0" encoding="utf-8"?>
 <p:sld xmlns:a="http://schemas.openxmlformats.org/drawingml/2006/main" xmlns:r="http://schemas.openxmlformats.org/officeDocument/2006/relationships" xmlns:p="http://schemas.openxmlformats.org/presentationml/2006/main" show="0">
   <p:cSld>
     <p:spTree>
@@ -28897,7 +27715,7 @@
               <a:pPr>
                 <a:defRPr/>
               </a:pPr>
-              <a:t>27</a:t>
+              <a:t>25</a:t>
             </a:fld>
             <a:endParaRPr lang="en-US" dirty="0"/>
           </a:p>
@@ -30732,7 +29550,7 @@
 </p:sld>
 </file>
 
-<file path=ppt/slides/slide28.xml><?xml version="1.0" encoding="utf-8"?>
+<file path=ppt/slides/slide26.xml><?xml version="1.0" encoding="utf-8"?>
 <p:sld xmlns:a="http://schemas.openxmlformats.org/drawingml/2006/main" xmlns:r="http://schemas.openxmlformats.org/officeDocument/2006/relationships" xmlns:p="http://schemas.openxmlformats.org/presentationml/2006/main" show="0">
   <p:cSld>
     <p:spTree>
@@ -31609,7 +30427,7 @@
               <a:pPr>
                 <a:defRPr/>
               </a:pPr>
-              <a:t>28</a:t>
+              <a:t>26</a:t>
             </a:fld>
             <a:endParaRPr lang="en-US" dirty="0"/>
           </a:p>
@@ -32234,7 +31052,7 @@
 </p:sld>
 </file>
 
-<file path=ppt/slides/slide29.xml><?xml version="1.0" encoding="utf-8"?>
+<file path=ppt/slides/slide27.xml><?xml version="1.0" encoding="utf-8"?>
 <p:sld xmlns:a="http://schemas.openxmlformats.org/drawingml/2006/main" xmlns:r="http://schemas.openxmlformats.org/officeDocument/2006/relationships" xmlns:p="http://schemas.openxmlformats.org/presentationml/2006/main" show="0">
   <p:cSld>
     <p:spTree>
@@ -32278,7 +31096,7 @@
               <a:pPr>
                 <a:defRPr/>
               </a:pPr>
-              <a:t>29</a:t>
+              <a:t>27</a:t>
             </a:fld>
             <a:endParaRPr lang="en-US" dirty="0"/>
           </a:p>
@@ -34294,6 +33112,1198 @@
 </p:sld>
 </file>
 
+<file path=ppt/slides/slide28.xml><?xml version="1.0" encoding="utf-8"?>
+<p:sld xmlns:a="http://schemas.openxmlformats.org/drawingml/2006/main" xmlns:r="http://schemas.openxmlformats.org/officeDocument/2006/relationships" xmlns:p="http://schemas.openxmlformats.org/presentationml/2006/main" show="0">
+  <p:cSld>
+    <p:spTree>
+      <p:nvGrpSpPr>
+        <p:cNvPr id="1" name=""/>
+        <p:cNvGrpSpPr/>
+        <p:nvPr/>
+      </p:nvGrpSpPr>
+      <p:grpSpPr>
+        <a:xfrm>
+          <a:off x="0" y="0"/>
+          <a:ext cx="0" cy="0"/>
+          <a:chOff x="0" y="0"/>
+          <a:chExt cx="0" cy="0"/>
+        </a:xfrm>
+      </p:grpSpPr>
+      <p:sp>
+        <p:nvSpPr>
+          <p:cNvPr id="2" name="Title 1"/>
+          <p:cNvSpPr>
+            <a:spLocks noGrp="1"/>
+          </p:cNvSpPr>
+          <p:nvPr>
+            <p:ph type="title"/>
+          </p:nvPr>
+        </p:nvSpPr>
+        <p:spPr/>
+        <p:txBody>
+          <a:bodyPr/>
+          <a:lstStyle/>
+          <a:p>
+            <a:r>
+              <a:rPr lang="en-US" dirty="0" smtClean="0"/>
+              <a:t>Corollary</a:t>
+            </a:r>
+            <a:endParaRPr lang="en-US" dirty="0"/>
+          </a:p>
+        </p:txBody>
+      </p:sp>
+      <p:sp>
+        <p:nvSpPr>
+          <p:cNvPr id="3" name="Content Placeholder 2"/>
+          <p:cNvSpPr>
+            <a:spLocks noGrp="1"/>
+          </p:cNvSpPr>
+          <p:nvPr>
+            <p:ph idx="1"/>
+          </p:nvPr>
+        </p:nvSpPr>
+        <p:spPr>
+          <a:xfrm>
+            <a:off x="381000" y="1143000"/>
+            <a:ext cx="8763000" cy="2057400"/>
+          </a:xfrm>
+        </p:spPr>
+        <p:txBody>
+          <a:bodyPr/>
+          <a:lstStyle/>
+          <a:p>
+            <a:pPr>
+              <a:lnSpc>
+                <a:spcPct val="80000"/>
+              </a:lnSpc>
+            </a:pPr>
+            <a:r>
+              <a:rPr lang="en-US" sz="4400" dirty="0" smtClean="0"/>
+              <a:t>     MST </a:t>
+            </a:r>
+            <a:r>
+              <a:rPr lang="en-US" sz="4400" dirty="0">
+                <a:solidFill>
+                  <a:schemeClr val="accent1">
+                    <a:lumMod val="50000"/>
+                  </a:schemeClr>
+                </a:solidFill>
+              </a:rPr>
+              <a:t>C</a:t>
+            </a:r>
+            <a:r>
+              <a:rPr lang="en-US" sz="4400" dirty="0"/>
+              <a:t> is </a:t>
+            </a:r>
+            <a:r>
+              <a:rPr lang="en-US" sz="4400" dirty="0" smtClean="0"/>
+              <a:t>unique if all weights </a:t>
+            </a:r>
+          </a:p>
+          <a:p>
+            <a:pPr>
+              <a:lnSpc>
+                <a:spcPct val="80000"/>
+              </a:lnSpc>
+            </a:pPr>
+            <a:r>
+              <a:rPr lang="en-US" sz="4400" dirty="0" smtClean="0"/>
+              <a:t>differ:</a:t>
+            </a:r>
+          </a:p>
+        </p:txBody>
+      </p:sp>
+      <p:sp>
+        <p:nvSpPr>
+          <p:cNvPr id="4" name="Slide Number Placeholder 3"/>
+          <p:cNvSpPr>
+            <a:spLocks noGrp="1"/>
+          </p:cNvSpPr>
+          <p:nvPr>
+            <p:ph type="sldNum" sz="quarter" idx="4"/>
+          </p:nvPr>
+        </p:nvSpPr>
+        <p:spPr/>
+        <p:txBody>
+          <a:bodyPr/>
+          <a:lstStyle/>
+          <a:p>
+            <a:pPr>
+              <a:defRPr/>
+            </a:pPr>
+            <a:r>
+              <a:rPr lang="en-US" smtClean="0"/>
+              <a:t>connected.</a:t>
+            </a:r>
+            <a:fld id="{D7F2FC53-1536-41A9-A9C1-2199CF803E30}" type="slidenum">
+              <a:rPr lang="en-US" smtClean="0"/>
+              <a:pPr>
+                <a:defRPr/>
+              </a:pPr>
+              <a:t>28</a:t>
+            </a:fld>
+            <a:endParaRPr lang="en-US" dirty="0"/>
+          </a:p>
+        </p:txBody>
+      </p:sp>
+      <p:sp>
+        <p:nvSpPr>
+          <p:cNvPr id="6" name="TextBox 5"/>
+          <p:cNvSpPr txBox="1"/>
+          <p:nvPr/>
+        </p:nvSpPr>
+        <p:spPr>
+          <a:xfrm>
+            <a:off x="381000" y="1676400"/>
+            <a:ext cx="8534400" cy="3477875"/>
+          </a:xfrm>
+          <a:prstGeom prst="rect">
+            <a:avLst/>
+          </a:prstGeom>
+          <a:noFill/>
+        </p:spPr>
+        <p:txBody>
+          <a:bodyPr wrap="square" rtlCol="0">
+            <a:spAutoFit/>
+          </a:bodyPr>
+          <a:lstStyle/>
+          <a:p>
+            <a:r>
+              <a:rPr lang="en-US" sz="4400" dirty="0" smtClean="0"/>
+              <a:t>            if </a:t>
+            </a:r>
+            <a:r>
+              <a:rPr lang="en-US" sz="4400" dirty="0" smtClean="0">
+                <a:solidFill>
+                  <a:schemeClr val="accent1">
+                    <a:lumMod val="50000"/>
+                  </a:schemeClr>
+                </a:solidFill>
+              </a:rPr>
+              <a:t>e </a:t>
+            </a:r>
+            <a:r>
+              <a:rPr lang="en-US" sz="4400" dirty="0" smtClean="0"/>
+              <a:t>not a </a:t>
+            </a:r>
+            <a:r>
+              <a:rPr lang="en-US" sz="4400" dirty="0" smtClean="0">
+                <a:solidFill>
+                  <a:srgbClr val="0000E5"/>
+                </a:solidFill>
+              </a:rPr>
+              <a:t>C</a:t>
+            </a:r>
+            <a:r>
+              <a:rPr lang="en-US" sz="4400" dirty="0" smtClean="0"/>
+              <a:t>-edge then</a:t>
+            </a:r>
+          </a:p>
+          <a:p>
+            <a:pPr algn="ctr"/>
+            <a:r>
+              <a:rPr lang="en-US" sz="4400" dirty="0" smtClean="0">
+                <a:solidFill>
+                  <a:srgbClr val="0000E5"/>
+                </a:solidFill>
+                <a:latin typeface="Comic Sans MS"/>
+                <a:cs typeface="Comic Sans MS"/>
+              </a:rPr>
+              <a:t>w</a:t>
+            </a:r>
+            <a:r>
+              <a:rPr lang="en-US" sz="4400" dirty="0">
+                <a:solidFill>
+                  <a:srgbClr val="0000E5"/>
+                </a:solidFill>
+                <a:latin typeface="Comic Sans MS"/>
+                <a:cs typeface="Comic Sans MS"/>
+              </a:rPr>
+              <a:t>(e) </a:t>
+            </a:r>
+            <a:r>
+              <a:rPr lang="en-US" sz="4400" b="1" dirty="0" smtClean="0">
+                <a:solidFill>
+                  <a:srgbClr val="0000E5"/>
+                </a:solidFill>
+                <a:latin typeface="Euclid Symbol" charset="2"/>
+                <a:cs typeface="Euclid Symbol" charset="2"/>
+              </a:rPr>
+              <a:t>&lt; </a:t>
+            </a:r>
+            <a:r>
+              <a:rPr lang="en-US" sz="4400" dirty="0">
+                <a:solidFill>
+                  <a:srgbClr val="0000E5"/>
+                </a:solidFill>
+                <a:latin typeface="Comic Sans MS"/>
+                <a:cs typeface="Comic Sans MS"/>
+              </a:rPr>
+              <a:t>w(g</a:t>
+            </a:r>
+            <a:r>
+              <a:rPr lang="en-US" sz="4400" dirty="0" smtClean="0">
+                <a:solidFill>
+                  <a:srgbClr val="0000E5"/>
+                </a:solidFill>
+                <a:latin typeface="Comic Sans MS"/>
+                <a:cs typeface="Comic Sans MS"/>
+              </a:rPr>
+              <a:t>)</a:t>
+            </a:r>
+            <a:endParaRPr lang="en-US" sz="4400" dirty="0">
+              <a:latin typeface="Comic Sans MS"/>
+              <a:cs typeface="Comic Sans MS"/>
+            </a:endParaRPr>
+          </a:p>
+          <a:p>
+            <a:pPr algn="ctr"/>
+            <a:r>
+              <a:rPr lang="en-US" sz="4400" dirty="0">
+                <a:latin typeface="Comic Sans MS"/>
+                <a:cs typeface="Comic Sans MS"/>
+              </a:rPr>
+              <a:t> </a:t>
+            </a:r>
+            <a:r>
+              <a:rPr lang="en-US" sz="4400" dirty="0">
+                <a:solidFill>
+                  <a:schemeClr val="accent1">
+                    <a:lumMod val="50000"/>
+                  </a:schemeClr>
+                </a:solidFill>
+                <a:latin typeface="Comic Sans MS"/>
+                <a:cs typeface="Comic Sans MS"/>
+              </a:rPr>
+              <a:t>w</a:t>
+            </a:r>
+            <a:r>
+              <a:rPr lang="en-US" sz="4400" dirty="0" smtClean="0">
+                <a:solidFill>
+                  <a:schemeClr val="accent1">
+                    <a:lumMod val="50000"/>
+                  </a:schemeClr>
+                </a:solidFill>
+                <a:latin typeface="Comic Sans MS"/>
+                <a:cs typeface="Comic Sans MS"/>
+              </a:rPr>
+              <a:t>(</a:t>
+            </a:r>
+            <a:r>
+              <a:rPr lang="en-US" sz="4400" dirty="0">
+                <a:solidFill>
+                  <a:srgbClr val="008000"/>
+                </a:solidFill>
+                <a:latin typeface="Comic Sans MS"/>
+                <a:cs typeface="Comic Sans MS"/>
+              </a:rPr>
+              <a:t>D</a:t>
+            </a:r>
+            <a:r>
+              <a:rPr lang="en-US" sz="4400" dirty="0" smtClean="0">
+                <a:solidFill>
+                  <a:schemeClr val="accent1">
+                    <a:lumMod val="50000"/>
+                  </a:schemeClr>
+                </a:solidFill>
+                <a:latin typeface="Comic Sans MS"/>
+                <a:cs typeface="Comic Sans MS"/>
+              </a:rPr>
+              <a:t>) </a:t>
+            </a:r>
+            <a:r>
+              <a:rPr lang="en-US" sz="4400" b="1" dirty="0" smtClean="0">
+                <a:solidFill>
+                  <a:srgbClr val="0000E5"/>
+                </a:solidFill>
+                <a:latin typeface="Euclid Symbol" charset="2"/>
+                <a:cs typeface="Euclid Symbol" charset="2"/>
+              </a:rPr>
+              <a:t>&lt; </a:t>
+            </a:r>
+            <a:r>
+              <a:rPr lang="en-US" sz="4400" dirty="0">
+                <a:solidFill>
+                  <a:srgbClr val="0000E5"/>
+                </a:solidFill>
+                <a:latin typeface="Comic Sans MS"/>
+                <a:cs typeface="Comic Sans MS"/>
+              </a:rPr>
+              <a:t>w</a:t>
+            </a:r>
+            <a:r>
+              <a:rPr lang="en-US" sz="4400" dirty="0" smtClean="0">
+                <a:solidFill>
+                  <a:srgbClr val="0000E5"/>
+                </a:solidFill>
+                <a:latin typeface="Comic Sans MS"/>
+                <a:cs typeface="Comic Sans MS"/>
+              </a:rPr>
+              <a:t>(C)</a:t>
+            </a:r>
+          </a:p>
+          <a:p>
+            <a:r>
+              <a:rPr lang="en-US" sz="4400" dirty="0" smtClean="0">
+                <a:latin typeface="Comic Sans MS"/>
+                <a:cs typeface="Comic Sans MS"/>
+              </a:rPr>
+              <a:t>contradicting min weight for</a:t>
+            </a:r>
+            <a:r>
+              <a:rPr lang="en-US" sz="4400" dirty="0" smtClean="0">
+                <a:solidFill>
+                  <a:srgbClr val="0000E5"/>
+                </a:solidFill>
+                <a:latin typeface="Comic Sans MS"/>
+                <a:cs typeface="Comic Sans MS"/>
+              </a:rPr>
+              <a:t> C</a:t>
+            </a:r>
+            <a:r>
+              <a:rPr lang="en-US" sz="4400" dirty="0" smtClean="0">
+                <a:latin typeface="Comic Sans MS"/>
+                <a:cs typeface="Comic Sans MS"/>
+              </a:rPr>
+              <a:t>.</a:t>
+            </a:r>
+          </a:p>
+          <a:p>
+            <a:r>
+              <a:rPr lang="en-US" sz="4400" dirty="0" smtClean="0">
+                <a:latin typeface="Comic Sans MS"/>
+                <a:cs typeface="Comic Sans MS"/>
+              </a:rPr>
+              <a:t>So only </a:t>
+            </a:r>
+            <a:r>
+              <a:rPr lang="en-US" sz="4400" dirty="0" smtClean="0">
+                <a:solidFill>
+                  <a:srgbClr val="930093"/>
+                </a:solidFill>
+                <a:latin typeface="Comic Sans MS"/>
+                <a:cs typeface="Comic Sans MS"/>
+              </a:rPr>
+              <a:t>Case 1</a:t>
+            </a:r>
+            <a:r>
+              <a:rPr lang="en-US" sz="4400" dirty="0" smtClean="0">
+                <a:latin typeface="Comic Sans MS"/>
+                <a:cs typeface="Comic Sans MS"/>
+              </a:rPr>
+              <a:t> is possible:</a:t>
+            </a:r>
+          </a:p>
+        </p:txBody>
+      </p:sp>
+    </p:spTree>
+    <p:extLst>
+      <p:ext uri="{BB962C8B-B14F-4D97-AF65-F5344CB8AC3E}">
+        <p14:creationId xmlns:p14="http://schemas.microsoft.com/office/powerpoint/2010/main" val="1887847755"/>
+      </p:ext>
+    </p:extLst>
+  </p:cSld>
+  <p:clrMapOvr>
+    <a:masterClrMapping/>
+  </p:clrMapOvr>
+  <p:transition xmlns:p14="http://schemas.microsoft.com/office/powerpoint/2010/main" spd="slow" advClick="0">
+    <p:fade thruBlk="1"/>
+  </p:transition>
+  <p:timing>
+    <p:tnLst>
+      <p:par>
+        <p:cTn xmlns:p14="http://schemas.microsoft.com/office/powerpoint/2010/main" id="1" dur="indefinite" restart="never" nodeType="tmRoot">
+          <p:childTnLst>
+            <p:seq concurrent="1" nextAc="seek">
+              <p:cTn id="2" dur="indefinite" nodeType="mainSeq">
+                <p:childTnLst>
+                  <p:par>
+                    <p:cTn id="3" fill="hold">
+                      <p:stCondLst>
+                        <p:cond delay="indefinite"/>
+                      </p:stCondLst>
+                      <p:childTnLst>
+                        <p:par>
+                          <p:cTn id="4" fill="hold">
+                            <p:stCondLst>
+                              <p:cond delay="0"/>
+                            </p:stCondLst>
+                            <p:childTnLst>
+                              <p:par>
+                                <p:cTn id="5" presetID="10" presetClass="entr" presetSubtype="0" fill="hold" grpId="0" nodeType="clickEffect">
+                                  <p:stCondLst>
+                                    <p:cond delay="0"/>
+                                  </p:stCondLst>
+                                  <p:childTnLst>
+                                    <p:set>
+                                      <p:cBhvr>
+                                        <p:cTn id="6" dur="1" fill="hold">
+                                          <p:stCondLst>
+                                            <p:cond delay="0"/>
+                                          </p:stCondLst>
+                                        </p:cTn>
+                                        <p:tgtEl>
+                                          <p:spTgt spid="6">
+                                            <p:txEl>
+                                              <p:pRg st="0" end="0"/>
+                                            </p:txEl>
+                                          </p:spTgt>
+                                        </p:tgtEl>
+                                        <p:attrNameLst>
+                                          <p:attrName>style.visibility</p:attrName>
+                                        </p:attrNameLst>
+                                      </p:cBhvr>
+                                      <p:to>
+                                        <p:strVal val="visible"/>
+                                      </p:to>
+                                    </p:set>
+                                    <p:animEffect transition="in" filter="fade">
+                                      <p:cBhvr>
+                                        <p:cTn id="7" dur="500"/>
+                                        <p:tgtEl>
+                                          <p:spTgt spid="6">
+                                            <p:txEl>
+                                              <p:pRg st="0" end="0"/>
+                                            </p:txEl>
+                                          </p:spTgt>
+                                        </p:tgtEl>
+                                      </p:cBhvr>
+                                    </p:animEffect>
+                                  </p:childTnLst>
+                                </p:cTn>
+                              </p:par>
+                            </p:childTnLst>
+                          </p:cTn>
+                        </p:par>
+                      </p:childTnLst>
+                    </p:cTn>
+                  </p:par>
+                  <p:par>
+                    <p:cTn id="8" fill="hold">
+                      <p:stCondLst>
+                        <p:cond delay="indefinite"/>
+                      </p:stCondLst>
+                      <p:childTnLst>
+                        <p:par>
+                          <p:cTn id="9" fill="hold">
+                            <p:stCondLst>
+                              <p:cond delay="0"/>
+                            </p:stCondLst>
+                            <p:childTnLst>
+                              <p:par>
+                                <p:cTn id="10" presetID="22" presetClass="entr" presetSubtype="8" fill="hold" grpId="0" nodeType="clickEffect">
+                                  <p:stCondLst>
+                                    <p:cond delay="0"/>
+                                  </p:stCondLst>
+                                  <p:childTnLst>
+                                    <p:set>
+                                      <p:cBhvr>
+                                        <p:cTn id="11" dur="1" fill="hold">
+                                          <p:stCondLst>
+                                            <p:cond delay="0"/>
+                                          </p:stCondLst>
+                                        </p:cTn>
+                                        <p:tgtEl>
+                                          <p:spTgt spid="6">
+                                            <p:txEl>
+                                              <p:pRg st="1" end="1"/>
+                                            </p:txEl>
+                                          </p:spTgt>
+                                        </p:tgtEl>
+                                        <p:attrNameLst>
+                                          <p:attrName>style.visibility</p:attrName>
+                                        </p:attrNameLst>
+                                      </p:cBhvr>
+                                      <p:to>
+                                        <p:strVal val="visible"/>
+                                      </p:to>
+                                    </p:set>
+                                    <p:animEffect transition="in" filter="wipe(left)">
+                                      <p:cBhvr>
+                                        <p:cTn id="12" dur="1000"/>
+                                        <p:tgtEl>
+                                          <p:spTgt spid="6">
+                                            <p:txEl>
+                                              <p:pRg st="1" end="1"/>
+                                            </p:txEl>
+                                          </p:spTgt>
+                                        </p:tgtEl>
+                                      </p:cBhvr>
+                                    </p:animEffect>
+                                  </p:childTnLst>
+                                </p:cTn>
+                              </p:par>
+                            </p:childTnLst>
+                          </p:cTn>
+                        </p:par>
+                      </p:childTnLst>
+                    </p:cTn>
+                  </p:par>
+                  <p:par>
+                    <p:cTn id="13" fill="hold">
+                      <p:stCondLst>
+                        <p:cond delay="indefinite"/>
+                      </p:stCondLst>
+                      <p:childTnLst>
+                        <p:par>
+                          <p:cTn id="14" fill="hold">
+                            <p:stCondLst>
+                              <p:cond delay="0"/>
+                            </p:stCondLst>
+                            <p:childTnLst>
+                              <p:par>
+                                <p:cTn id="15" presetID="22" presetClass="entr" presetSubtype="8" fill="hold" grpId="0" nodeType="clickEffect">
+                                  <p:stCondLst>
+                                    <p:cond delay="0"/>
+                                  </p:stCondLst>
+                                  <p:childTnLst>
+                                    <p:set>
+                                      <p:cBhvr>
+                                        <p:cTn id="16" dur="1" fill="hold">
+                                          <p:stCondLst>
+                                            <p:cond delay="0"/>
+                                          </p:stCondLst>
+                                        </p:cTn>
+                                        <p:tgtEl>
+                                          <p:spTgt spid="6">
+                                            <p:txEl>
+                                              <p:pRg st="2" end="2"/>
+                                            </p:txEl>
+                                          </p:spTgt>
+                                        </p:tgtEl>
+                                        <p:attrNameLst>
+                                          <p:attrName>style.visibility</p:attrName>
+                                        </p:attrNameLst>
+                                      </p:cBhvr>
+                                      <p:to>
+                                        <p:strVal val="visible"/>
+                                      </p:to>
+                                    </p:set>
+                                    <p:animEffect transition="in" filter="wipe(left)">
+                                      <p:cBhvr>
+                                        <p:cTn id="17" dur="1000"/>
+                                        <p:tgtEl>
+                                          <p:spTgt spid="6">
+                                            <p:txEl>
+                                              <p:pRg st="2" end="2"/>
+                                            </p:txEl>
+                                          </p:spTgt>
+                                        </p:tgtEl>
+                                      </p:cBhvr>
+                                    </p:animEffect>
+                                  </p:childTnLst>
+                                </p:cTn>
+                              </p:par>
+                            </p:childTnLst>
+                          </p:cTn>
+                        </p:par>
+                      </p:childTnLst>
+                    </p:cTn>
+                  </p:par>
+                  <p:par>
+                    <p:cTn id="18" fill="hold">
+                      <p:stCondLst>
+                        <p:cond delay="indefinite"/>
+                      </p:stCondLst>
+                      <p:childTnLst>
+                        <p:par>
+                          <p:cTn id="19" fill="hold">
+                            <p:stCondLst>
+                              <p:cond delay="0"/>
+                            </p:stCondLst>
+                            <p:childTnLst>
+                              <p:par>
+                                <p:cTn id="20" presetID="10" presetClass="entr" presetSubtype="0" fill="hold" grpId="0" nodeType="clickEffect">
+                                  <p:stCondLst>
+                                    <p:cond delay="0"/>
+                                  </p:stCondLst>
+                                  <p:childTnLst>
+                                    <p:set>
+                                      <p:cBhvr>
+                                        <p:cTn id="21" dur="1" fill="hold">
+                                          <p:stCondLst>
+                                            <p:cond delay="0"/>
+                                          </p:stCondLst>
+                                        </p:cTn>
+                                        <p:tgtEl>
+                                          <p:spTgt spid="6">
+                                            <p:txEl>
+                                              <p:pRg st="3" end="3"/>
+                                            </p:txEl>
+                                          </p:spTgt>
+                                        </p:tgtEl>
+                                        <p:attrNameLst>
+                                          <p:attrName>style.visibility</p:attrName>
+                                        </p:attrNameLst>
+                                      </p:cBhvr>
+                                      <p:to>
+                                        <p:strVal val="visible"/>
+                                      </p:to>
+                                    </p:set>
+                                    <p:animEffect transition="in" filter="fade">
+                                      <p:cBhvr>
+                                        <p:cTn id="22" dur="500"/>
+                                        <p:tgtEl>
+                                          <p:spTgt spid="6">
+                                            <p:txEl>
+                                              <p:pRg st="3" end="3"/>
+                                            </p:txEl>
+                                          </p:spTgt>
+                                        </p:tgtEl>
+                                      </p:cBhvr>
+                                    </p:animEffect>
+                                  </p:childTnLst>
+                                </p:cTn>
+                              </p:par>
+                            </p:childTnLst>
+                          </p:cTn>
+                        </p:par>
+                      </p:childTnLst>
+                    </p:cTn>
+                  </p:par>
+                  <p:par>
+                    <p:cTn id="23" fill="hold">
+                      <p:stCondLst>
+                        <p:cond delay="indefinite"/>
+                      </p:stCondLst>
+                      <p:childTnLst>
+                        <p:par>
+                          <p:cTn id="24" fill="hold">
+                            <p:stCondLst>
+                              <p:cond delay="0"/>
+                            </p:stCondLst>
+                            <p:childTnLst>
+                              <p:par>
+                                <p:cTn id="25" presetID="10" presetClass="entr" presetSubtype="0" fill="hold" grpId="0" nodeType="clickEffect">
+                                  <p:stCondLst>
+                                    <p:cond delay="0"/>
+                                  </p:stCondLst>
+                                  <p:childTnLst>
+                                    <p:set>
+                                      <p:cBhvr>
+                                        <p:cTn id="26" dur="1" fill="hold">
+                                          <p:stCondLst>
+                                            <p:cond delay="0"/>
+                                          </p:stCondLst>
+                                        </p:cTn>
+                                        <p:tgtEl>
+                                          <p:spTgt spid="6">
+                                            <p:txEl>
+                                              <p:pRg st="4" end="4"/>
+                                            </p:txEl>
+                                          </p:spTgt>
+                                        </p:tgtEl>
+                                        <p:attrNameLst>
+                                          <p:attrName>style.visibility</p:attrName>
+                                        </p:attrNameLst>
+                                      </p:cBhvr>
+                                      <p:to>
+                                        <p:strVal val="visible"/>
+                                      </p:to>
+                                    </p:set>
+                                    <p:animEffect transition="in" filter="fade">
+                                      <p:cBhvr>
+                                        <p:cTn id="27" dur="500"/>
+                                        <p:tgtEl>
+                                          <p:spTgt spid="6">
+                                            <p:txEl>
+                                              <p:pRg st="4" end="4"/>
+                                            </p:txEl>
+                                          </p:spTgt>
+                                        </p:tgtEl>
+                                      </p:cBhvr>
+                                    </p:animEffect>
+                                  </p:childTnLst>
+                                </p:cTn>
+                              </p:par>
+                            </p:childTnLst>
+                          </p:cTn>
+                        </p:par>
+                      </p:childTnLst>
+                    </p:cTn>
+                  </p:par>
+                </p:childTnLst>
+              </p:cTn>
+              <p:prevCondLst>
+                <p:cond evt="onPrev" delay="0">
+                  <p:tgtEl>
+                    <p:sldTgt/>
+                  </p:tgtEl>
+                </p:cond>
+              </p:prevCondLst>
+              <p:nextCondLst>
+                <p:cond evt="onNext" delay="0">
+                  <p:tgtEl>
+                    <p:sldTgt/>
+                  </p:tgtEl>
+                </p:cond>
+              </p:nextCondLst>
+            </p:seq>
+          </p:childTnLst>
+        </p:cTn>
+      </p:par>
+    </p:tnLst>
+    <p:bldLst>
+      <p:bldP spid="6" grpId="0" build="p"/>
+    </p:bldLst>
+  </p:timing>
+</p:sld>
+</file>
+
+<file path=ppt/slides/slide29.xml><?xml version="1.0" encoding="utf-8"?>
+<p:sld xmlns:a="http://schemas.openxmlformats.org/drawingml/2006/main" xmlns:r="http://schemas.openxmlformats.org/officeDocument/2006/relationships" xmlns:p="http://schemas.openxmlformats.org/presentationml/2006/main" show="0">
+  <p:cSld>
+    <p:spTree>
+      <p:nvGrpSpPr>
+        <p:cNvPr id="1" name=""/>
+        <p:cNvGrpSpPr/>
+        <p:nvPr/>
+      </p:nvGrpSpPr>
+      <p:grpSpPr>
+        <a:xfrm>
+          <a:off x="0" y="0"/>
+          <a:ext cx="0" cy="0"/>
+          <a:chOff x="0" y="0"/>
+          <a:chExt cx="0" cy="0"/>
+        </a:xfrm>
+      </p:grpSpPr>
+      <p:sp>
+        <p:nvSpPr>
+          <p:cNvPr id="2" name="Title 1"/>
+          <p:cNvSpPr>
+            <a:spLocks noGrp="1"/>
+          </p:cNvSpPr>
+          <p:nvPr>
+            <p:ph type="title"/>
+          </p:nvPr>
+        </p:nvSpPr>
+        <p:spPr/>
+        <p:txBody>
+          <a:bodyPr/>
+          <a:lstStyle/>
+          <a:p>
+            <a:r>
+              <a:rPr lang="en-US" dirty="0" smtClean="0"/>
+              <a:t>Corollary</a:t>
+            </a:r>
+            <a:endParaRPr lang="en-US" dirty="0"/>
+          </a:p>
+        </p:txBody>
+      </p:sp>
+      <p:sp>
+        <p:nvSpPr>
+          <p:cNvPr id="3" name="Content Placeholder 2"/>
+          <p:cNvSpPr>
+            <a:spLocks noGrp="1"/>
+          </p:cNvSpPr>
+          <p:nvPr>
+            <p:ph idx="1"/>
+          </p:nvPr>
+        </p:nvSpPr>
+        <p:spPr>
+          <a:xfrm>
+            <a:off x="381000" y="1143000"/>
+            <a:ext cx="8763000" cy="2057400"/>
+          </a:xfrm>
+        </p:spPr>
+        <p:txBody>
+          <a:bodyPr/>
+          <a:lstStyle/>
+          <a:p>
+            <a:pPr>
+              <a:lnSpc>
+                <a:spcPct val="80000"/>
+              </a:lnSpc>
+            </a:pPr>
+            <a:r>
+              <a:rPr lang="en-US" sz="4400" dirty="0" smtClean="0"/>
+              <a:t>     MST </a:t>
+            </a:r>
+            <a:r>
+              <a:rPr lang="en-US" sz="4400" dirty="0">
+                <a:solidFill>
+                  <a:schemeClr val="accent1">
+                    <a:lumMod val="50000"/>
+                  </a:schemeClr>
+                </a:solidFill>
+              </a:rPr>
+              <a:t>C</a:t>
+            </a:r>
+            <a:r>
+              <a:rPr lang="en-US" sz="4400" dirty="0"/>
+              <a:t> is </a:t>
+            </a:r>
+            <a:r>
+              <a:rPr lang="en-US" sz="4400" dirty="0" smtClean="0"/>
+              <a:t>unique if all weights </a:t>
+            </a:r>
+          </a:p>
+          <a:p>
+            <a:pPr>
+              <a:lnSpc>
+                <a:spcPct val="80000"/>
+              </a:lnSpc>
+            </a:pPr>
+            <a:r>
+              <a:rPr lang="en-US" sz="4400" dirty="0" smtClean="0"/>
+              <a:t>differ:</a:t>
+            </a:r>
+          </a:p>
+        </p:txBody>
+      </p:sp>
+      <p:sp>
+        <p:nvSpPr>
+          <p:cNvPr id="4" name="Slide Number Placeholder 3"/>
+          <p:cNvSpPr>
+            <a:spLocks noGrp="1"/>
+          </p:cNvSpPr>
+          <p:nvPr>
+            <p:ph type="sldNum" sz="quarter" idx="4"/>
+          </p:nvPr>
+        </p:nvSpPr>
+        <p:spPr/>
+        <p:txBody>
+          <a:bodyPr/>
+          <a:lstStyle/>
+          <a:p>
+            <a:pPr>
+              <a:defRPr/>
+            </a:pPr>
+            <a:r>
+              <a:rPr lang="en-US" smtClean="0"/>
+              <a:t>connected.</a:t>
+            </a:r>
+            <a:fld id="{D7F2FC53-1536-41A9-A9C1-2199CF803E30}" type="slidenum">
+              <a:rPr lang="en-US" smtClean="0"/>
+              <a:pPr>
+                <a:defRPr/>
+              </a:pPr>
+              <a:t>29</a:t>
+            </a:fld>
+            <a:endParaRPr lang="en-US" dirty="0"/>
+          </a:p>
+        </p:txBody>
+      </p:sp>
+      <p:sp>
+        <p:nvSpPr>
+          <p:cNvPr id="6" name="TextBox 5"/>
+          <p:cNvSpPr txBox="1"/>
+          <p:nvPr/>
+        </p:nvSpPr>
+        <p:spPr>
+          <a:xfrm>
+            <a:off x="381000" y="1676400"/>
+            <a:ext cx="8534400" cy="2800767"/>
+          </a:xfrm>
+          <a:prstGeom prst="rect">
+            <a:avLst/>
+          </a:prstGeom>
+          <a:noFill/>
+        </p:spPr>
+        <p:txBody>
+          <a:bodyPr wrap="square" rtlCol="0">
+            <a:spAutoFit/>
+          </a:bodyPr>
+          <a:lstStyle/>
+          <a:p>
+            <a:r>
+              <a:rPr lang="en-US" sz="4400" dirty="0" smtClean="0"/>
+              <a:t>            if </a:t>
+            </a:r>
+            <a:r>
+              <a:rPr lang="en-US" sz="4400" dirty="0" smtClean="0">
+                <a:solidFill>
+                  <a:schemeClr val="accent1">
+                    <a:lumMod val="50000"/>
+                  </a:schemeClr>
+                </a:solidFill>
+              </a:rPr>
+              <a:t>e </a:t>
+            </a:r>
+            <a:r>
+              <a:rPr lang="en-US" sz="4400" dirty="0" smtClean="0"/>
+              <a:t>not a </a:t>
+            </a:r>
+            <a:r>
+              <a:rPr lang="en-US" sz="4400" dirty="0" smtClean="0">
+                <a:solidFill>
+                  <a:srgbClr val="0000E5"/>
+                </a:solidFill>
+              </a:rPr>
+              <a:t>C</a:t>
+            </a:r>
+            <a:r>
+              <a:rPr lang="en-US" sz="4400" dirty="0" smtClean="0"/>
+              <a:t>-edge then</a:t>
+            </a:r>
+          </a:p>
+          <a:p>
+            <a:pPr algn="ctr"/>
+            <a:r>
+              <a:rPr lang="en-US" sz="4400" dirty="0" smtClean="0">
+                <a:solidFill>
+                  <a:srgbClr val="0000E5"/>
+                </a:solidFill>
+                <a:latin typeface="Comic Sans MS"/>
+                <a:cs typeface="Comic Sans MS"/>
+              </a:rPr>
+              <a:t>w</a:t>
+            </a:r>
+            <a:r>
+              <a:rPr lang="en-US" sz="4400" dirty="0">
+                <a:solidFill>
+                  <a:srgbClr val="0000E5"/>
+                </a:solidFill>
+                <a:latin typeface="Comic Sans MS"/>
+                <a:cs typeface="Comic Sans MS"/>
+              </a:rPr>
+              <a:t>(e) </a:t>
+            </a:r>
+            <a:r>
+              <a:rPr lang="en-US" sz="4400" b="1" dirty="0" smtClean="0">
+                <a:solidFill>
+                  <a:srgbClr val="0000E5"/>
+                </a:solidFill>
+                <a:latin typeface="Euclid Symbol" charset="2"/>
+                <a:cs typeface="Euclid Symbol" charset="2"/>
+              </a:rPr>
+              <a:t>&lt; </a:t>
+            </a:r>
+            <a:r>
+              <a:rPr lang="en-US" sz="4400" dirty="0">
+                <a:solidFill>
+                  <a:srgbClr val="0000E5"/>
+                </a:solidFill>
+                <a:latin typeface="Comic Sans MS"/>
+                <a:cs typeface="Comic Sans MS"/>
+              </a:rPr>
+              <a:t>w(g</a:t>
+            </a:r>
+            <a:r>
+              <a:rPr lang="en-US" sz="4400" dirty="0" smtClean="0">
+                <a:solidFill>
+                  <a:srgbClr val="0000E5"/>
+                </a:solidFill>
+                <a:latin typeface="Comic Sans MS"/>
+                <a:cs typeface="Comic Sans MS"/>
+              </a:rPr>
+              <a:t>)</a:t>
+            </a:r>
+            <a:endParaRPr lang="en-US" sz="4400" dirty="0">
+              <a:latin typeface="Comic Sans MS"/>
+              <a:cs typeface="Comic Sans MS"/>
+            </a:endParaRPr>
+          </a:p>
+          <a:p>
+            <a:pPr algn="ctr"/>
+            <a:r>
+              <a:rPr lang="en-US" sz="4400" dirty="0">
+                <a:latin typeface="Comic Sans MS"/>
+                <a:cs typeface="Comic Sans MS"/>
+              </a:rPr>
+              <a:t> </a:t>
+            </a:r>
+            <a:r>
+              <a:rPr lang="en-US" sz="4400" dirty="0">
+                <a:solidFill>
+                  <a:schemeClr val="accent1">
+                    <a:lumMod val="50000"/>
+                  </a:schemeClr>
+                </a:solidFill>
+                <a:latin typeface="Comic Sans MS"/>
+                <a:cs typeface="Comic Sans MS"/>
+              </a:rPr>
+              <a:t>w</a:t>
+            </a:r>
+            <a:r>
+              <a:rPr lang="en-US" sz="4400" dirty="0" smtClean="0">
+                <a:solidFill>
+                  <a:schemeClr val="accent1">
+                    <a:lumMod val="50000"/>
+                  </a:schemeClr>
+                </a:solidFill>
+                <a:latin typeface="Comic Sans MS"/>
+                <a:cs typeface="Comic Sans MS"/>
+              </a:rPr>
+              <a:t>(</a:t>
+            </a:r>
+            <a:r>
+              <a:rPr lang="en-US" sz="4400" dirty="0">
+                <a:solidFill>
+                  <a:srgbClr val="008000"/>
+                </a:solidFill>
+                <a:latin typeface="Comic Sans MS"/>
+                <a:cs typeface="Comic Sans MS"/>
+              </a:rPr>
+              <a:t>D</a:t>
+            </a:r>
+            <a:r>
+              <a:rPr lang="en-US" sz="4400" dirty="0" smtClean="0">
+                <a:solidFill>
+                  <a:schemeClr val="accent1">
+                    <a:lumMod val="50000"/>
+                  </a:schemeClr>
+                </a:solidFill>
+                <a:latin typeface="Comic Sans MS"/>
+                <a:cs typeface="Comic Sans MS"/>
+              </a:rPr>
+              <a:t>) </a:t>
+            </a:r>
+            <a:r>
+              <a:rPr lang="en-US" sz="4400" b="1" dirty="0" smtClean="0">
+                <a:solidFill>
+                  <a:srgbClr val="0000E5"/>
+                </a:solidFill>
+                <a:latin typeface="Euclid Symbol" charset="2"/>
+                <a:cs typeface="Euclid Symbol" charset="2"/>
+              </a:rPr>
+              <a:t>&lt; </a:t>
+            </a:r>
+            <a:r>
+              <a:rPr lang="en-US" sz="4400" dirty="0">
+                <a:solidFill>
+                  <a:srgbClr val="0000E5"/>
+                </a:solidFill>
+                <a:latin typeface="Comic Sans MS"/>
+                <a:cs typeface="Comic Sans MS"/>
+              </a:rPr>
+              <a:t>w</a:t>
+            </a:r>
+            <a:r>
+              <a:rPr lang="en-US" sz="4400" dirty="0" smtClean="0">
+                <a:solidFill>
+                  <a:srgbClr val="0000E5"/>
+                </a:solidFill>
+                <a:latin typeface="Comic Sans MS"/>
+                <a:cs typeface="Comic Sans MS"/>
+              </a:rPr>
+              <a:t>(C)</a:t>
+            </a:r>
+          </a:p>
+          <a:p>
+            <a:r>
+              <a:rPr lang="en-US" sz="4400" dirty="0" smtClean="0">
+                <a:latin typeface="Comic Sans MS"/>
+                <a:cs typeface="Comic Sans MS"/>
+              </a:rPr>
+              <a:t>contradicting min weight for</a:t>
+            </a:r>
+            <a:r>
+              <a:rPr lang="en-US" sz="4400" dirty="0" smtClean="0">
+                <a:solidFill>
+                  <a:srgbClr val="0000E5"/>
+                </a:solidFill>
+                <a:latin typeface="Comic Sans MS"/>
+                <a:cs typeface="Comic Sans MS"/>
+              </a:rPr>
+              <a:t> C</a:t>
+            </a:r>
+            <a:r>
+              <a:rPr lang="en-US" sz="4400" dirty="0" smtClean="0">
+                <a:latin typeface="Comic Sans MS"/>
+                <a:cs typeface="Comic Sans MS"/>
+              </a:rPr>
+              <a:t>.</a:t>
+            </a:r>
+          </a:p>
+        </p:txBody>
+      </p:sp>
+      <p:sp>
+        <p:nvSpPr>
+          <p:cNvPr id="5" name="Rectangle 4"/>
+          <p:cNvSpPr/>
+          <p:nvPr/>
+        </p:nvSpPr>
+        <p:spPr>
+          <a:xfrm>
+            <a:off x="762000" y="4419600"/>
+            <a:ext cx="7772400" cy="1754327"/>
+          </a:xfrm>
+          <a:prstGeom prst="rect">
+            <a:avLst/>
+          </a:prstGeom>
+        </p:spPr>
+        <p:txBody>
+          <a:bodyPr wrap="square">
+            <a:spAutoFit/>
+          </a:bodyPr>
+          <a:lstStyle/>
+          <a:p>
+            <a:r>
+              <a:rPr lang="en-US" sz="5400" dirty="0" smtClean="0">
+                <a:solidFill>
+                  <a:srgbClr val="930093"/>
+                </a:solidFill>
+                <a:latin typeface="Comic Sans MS"/>
+                <a:cs typeface="Comic Sans MS"/>
+              </a:rPr>
+              <a:t>MST </a:t>
+            </a:r>
+            <a:r>
+              <a:rPr lang="en-US" sz="5400" dirty="0">
+                <a:solidFill>
+                  <a:srgbClr val="930093"/>
+                </a:solidFill>
+                <a:latin typeface="Comic Sans MS"/>
+                <a:cs typeface="Comic Sans MS"/>
+              </a:rPr>
+              <a:t>consists of all the </a:t>
+            </a:r>
+            <a:r>
+              <a:rPr lang="en-US" sz="5400" dirty="0" smtClean="0">
+                <a:solidFill>
+                  <a:srgbClr val="930093"/>
+                </a:solidFill>
+                <a:latin typeface="Comic Sans MS"/>
+                <a:cs typeface="Comic Sans MS"/>
+              </a:rPr>
+              <a:t>min weight </a:t>
+            </a:r>
+            <a:r>
+              <a:rPr lang="en-US" sz="5400" dirty="0">
+                <a:solidFill>
+                  <a:srgbClr val="930093"/>
+                </a:solidFill>
+                <a:latin typeface="Comic Sans MS"/>
+                <a:cs typeface="Comic Sans MS"/>
+              </a:rPr>
+              <a:t>gray edges.</a:t>
+            </a:r>
+          </a:p>
+        </p:txBody>
+      </p:sp>
+    </p:spTree>
+    <p:extLst>
+      <p:ext uri="{BB962C8B-B14F-4D97-AF65-F5344CB8AC3E}">
+        <p14:creationId xmlns:p14="http://schemas.microsoft.com/office/powerpoint/2010/main" val="1389367833"/>
+      </p:ext>
+    </p:extLst>
+  </p:cSld>
+  <p:clrMapOvr>
+    <a:masterClrMapping/>
+  </p:clrMapOvr>
+  <mc:AlternateContent xmlns:mc="http://schemas.openxmlformats.org/markup-compatibility/2006">
+    <mc:Choice xmlns:p14="http://schemas.microsoft.com/office/powerpoint/2010/main" Requires="p14">
+      <p:transition spd="med" p14:dur="700" advClick="0">
+        <p:fade/>
+      </p:transition>
+    </mc:Choice>
+    <mc:Fallback>
+      <p:transition xmlns:p14="http://schemas.microsoft.com/office/powerpoint/2010/main" spd="med" advClick="0">
+        <p:fade/>
+      </p:transition>
+    </mc:Fallback>
+  </mc:AlternateContent>
+  <p:timing>
+    <p:tnLst>
+      <p:par>
+        <p:cTn xmlns:p14="http://schemas.microsoft.com/office/powerpoint/2010/main" id="1" dur="indefinite" restart="never" nodeType="tmRoot"/>
+      </p:par>
+    </p:tnLst>
+  </p:timing>
+</p:sld>
+</file>
+
 <file path=ppt/slides/slide3.xml><?xml version="1.0" encoding="utf-8"?>
 <p:sld xmlns:a="http://schemas.openxmlformats.org/drawingml/2006/main" xmlns:r="http://schemas.openxmlformats.org/officeDocument/2006/relationships" xmlns:p="http://schemas.openxmlformats.org/presentationml/2006/main">
   <p:cSld>
@@ -36188,19 +36198,7 @@
             </a:r>
             <a:r>
               <a:rPr lang="en-US" sz="4800" dirty="0" smtClean="0"/>
-              <a:t>, then </a:t>
-            </a:r>
-            <a:r>
-              <a:rPr lang="en-US" sz="4800" dirty="0" smtClean="0"/>
-              <a:t>some</a:t>
-            </a:r>
-            <a:r>
-              <a:rPr lang="en-US" sz="4800" dirty="0" smtClean="0"/>
-              <a:t> </a:t>
-            </a:r>
-            <a:r>
-              <a:rPr lang="en-US" sz="4800" dirty="0" smtClean="0"/>
-              <a:t>MST </a:t>
+              <a:t>, then some MST </a:t>
             </a:r>
             <a:r>
               <a:rPr lang="en-US" sz="4800" dirty="0" smtClean="0">
@@ -36334,13 +36332,13 @@
   </p:clrMapOvr>
   <mc:AlternateContent xmlns:mc="http://schemas.openxmlformats.org/markup-compatibility/2006">
     <mc:Choice xmlns:p14="http://schemas.microsoft.com/office/powerpoint/2010/main" Requires="p14">
-      <p:transition spd="slow" p14:dur="1200" advClick="0">
-        <p:fade/>
+      <p:transition spd="med" p14:dur="600" advClick="0">
+        <p:fade thruBlk="1"/>
       </p:transition>
     </mc:Choice>
     <mc:Fallback>
-      <p:transition xmlns:p14="http://schemas.microsoft.com/office/powerpoint/2010/main" spd="slow" advClick="0">
-        <p:fade/>
+      <p:transition xmlns:p14="http://schemas.microsoft.com/office/powerpoint/2010/main" spd="med" advClick="0">
+        <p:fade thruBlk="1"/>
       </p:transition>
     </mc:Fallback>
   </mc:AlternateContent>
@@ -36754,13 +36752,13 @@
   <p:clrMapOvr>
     <a:masterClrMapping/>
   </p:clrMapOvr>
-  <mc:AlternateContent xmlns:mc="http://schemas.openxmlformats.org/markup-compatibility/2006">
-    <mc:Choice xmlns:p14="http://schemas.microsoft.com/office/powerpoint/2010/main" Requires="p14">
+  <mc:AlternateContent xmlns:mc="http://schemas.openxmlformats.org/markup-compatibility/2006" xmlns:p14="http://schemas.microsoft.com/office/powerpoint/2010/main">
+    <mc:Choice Requires="p14">
       <p:transition p14:dur="400" advClick="0">
         <p:fade thruBlk="1"/>
       </p:transition>
     </mc:Choice>
-    <mc:Fallback>
+    <mc:Fallback xmlns="">
       <p:transition xmlns:p14="http://schemas.microsoft.com/office/powerpoint/2010/main" advClick="0">
         <p:fade thruBlk="1"/>
       </p:transition>

</xml_diff>

<commit_message>
edit cp9f CP_nonadjacent_books_counting_sequel gray-edges.pptx trees-minimum.pptx
</commit_message>
<xml_diff>
--- a/fall15/slidesF15/gray-edges.pptx
+++ b/fall15/slidesF15/gray-edges.pptx
@@ -7558,7 +7558,7 @@
           <a:graphicData uri="http://schemas.openxmlformats.org/presentationml/2006/ole">
             <mc:AlternateContent xmlns:mc="http://schemas.openxmlformats.org/markup-compatibility/2006">
               <mc:Choice xmlns:v="urn:schemas-microsoft-com:vml" Requires="v">
-                <p:oleObj spid="_x0000_s9238" name="Equation" r:id="rId3" imgW="546100" imgH="228600" progId="Equation.DSMT4">
+                <p:oleObj spid="_x0000_s9240" name="Equation" r:id="rId3" imgW="546100" imgH="228600" progId="Equation.DSMT4">
                   <p:embed/>
                 </p:oleObj>
               </mc:Choice>
@@ -9896,7 +9896,7 @@
           <a:graphicData uri="http://schemas.openxmlformats.org/presentationml/2006/ole">
             <mc:AlternateContent xmlns:mc="http://schemas.openxmlformats.org/markup-compatibility/2006">
               <mc:Choice xmlns:v="urn:schemas-microsoft-com:vml" Requires="v">
-                <p:oleObj spid="_x0000_s10261" name="Equation" r:id="rId3" imgW="647700" imgH="228600" progId="Equation.DSMT4">
+                <p:oleObj spid="_x0000_s10263" name="Equation" r:id="rId3" imgW="647700" imgH="228600" progId="Equation.DSMT4">
                   <p:embed/>
                 </p:oleObj>
               </mc:Choice>
@@ -10093,7 +10093,7 @@
           <a:graphicData uri="http://schemas.openxmlformats.org/presentationml/2006/ole">
             <mc:AlternateContent xmlns:mc="http://schemas.openxmlformats.org/markup-compatibility/2006">
               <mc:Choice xmlns:v="urn:schemas-microsoft-com:vml" Requires="v">
-                <p:oleObj spid="_x0000_s11286" name="Equation" r:id="rId3" imgW="1016000" imgH="228600" progId="Equation.DSMT4">
+                <p:oleObj spid="_x0000_s11288" name="Equation" r:id="rId3" imgW="1016000" imgH="228600" progId="Equation.DSMT4">
                   <p:embed/>
                 </p:oleObj>
               </mc:Choice>
@@ -10485,7 +10485,7 @@
           <a:graphicData uri="http://schemas.openxmlformats.org/presentationml/2006/ole">
             <mc:AlternateContent xmlns:mc="http://schemas.openxmlformats.org/markup-compatibility/2006">
               <mc:Choice xmlns:v="urn:schemas-microsoft-com:vml" Requires="v">
-                <p:oleObj spid="_x0000_s1043" name="Equation" r:id="rId3" imgW="1016000" imgH="228600" progId="Equation.DSMT4">
+                <p:oleObj spid="_x0000_s1045" name="Equation" r:id="rId3" imgW="1016000" imgH="228600" progId="Equation.DSMT4">
                   <p:embed/>
                 </p:oleObj>
               </mc:Choice>
@@ -10956,7 +10956,7 @@
           <a:graphicData uri="http://schemas.openxmlformats.org/presentationml/2006/ole">
             <mc:AlternateContent xmlns:mc="http://schemas.openxmlformats.org/markup-compatibility/2006">
               <mc:Choice xmlns:v="urn:schemas-microsoft-com:vml" Requires="v">
-                <p:oleObj spid="_x0000_s14354" name="Equation" r:id="rId3" imgW="1016000" imgH="228600" progId="Equation.DSMT4">
+                <p:oleObj spid="_x0000_s14356" name="Equation" r:id="rId3" imgW="1016000" imgH="228600" progId="Equation.DSMT4">
                   <p:embed/>
                 </p:oleObj>
               </mc:Choice>
@@ -12048,13 +12048,13 @@
   <p:clrMapOvr>
     <a:masterClrMapping/>
   </p:clrMapOvr>
-  <mc:AlternateContent xmlns:mc="http://schemas.openxmlformats.org/markup-compatibility/2006">
-    <mc:Choice xmlns:p14="http://schemas.microsoft.com/office/powerpoint/2010/main" Requires="p14">
+  <mc:AlternateContent xmlns:mc="http://schemas.openxmlformats.org/markup-compatibility/2006" xmlns:p14="http://schemas.microsoft.com/office/powerpoint/2010/main">
+    <mc:Choice Requires="p14">
       <p:transition spd="med" p14:dur="600" advClick="0">
         <p:fade/>
       </p:transition>
     </mc:Choice>
-    <mc:Fallback>
+    <mc:Fallback xmlns="">
       <p:transition xmlns:p14="http://schemas.microsoft.com/office/powerpoint/2010/main" spd="med" advClick="0">
         <p:fade/>
       </p:transition>
@@ -13543,7 +13543,7 @@
           <a:graphicData uri="http://schemas.openxmlformats.org/presentationml/2006/ole">
             <mc:AlternateContent xmlns:mc="http://schemas.openxmlformats.org/markup-compatibility/2006">
               <mc:Choice xmlns:v="urn:schemas-microsoft-com:vml" Requires="v">
-                <p:oleObj spid="_x0000_s15370" name="Equation" r:id="rId3" imgW="1016000" imgH="228600" progId="Equation.DSMT4">
+                <p:oleObj spid="_x0000_s15372" name="Equation" r:id="rId3" imgW="1016000" imgH="228600" progId="Equation.DSMT4">
                   <p:embed/>
                 </p:oleObj>
               </mc:Choice>
@@ -19825,7 +19825,7 @@
           <a:graphicData uri="http://schemas.openxmlformats.org/presentationml/2006/ole">
             <mc:AlternateContent xmlns:mc="http://schemas.openxmlformats.org/markup-compatibility/2006">
               <mc:Choice xmlns:v="urn:schemas-microsoft-com:vml" Requires="v">
-                <p:oleObj spid="_x0000_s2096" name="Equation" r:id="rId3" imgW="1130300" imgH="152400" progId="Equation.DSMT4">
+                <p:oleObj spid="_x0000_s2099" name="Equation" r:id="rId3" imgW="1130300" imgH="152400" progId="Equation.DSMT4">
                   <p:embed/>
                 </p:oleObj>
               </mc:Choice>
@@ -19882,7 +19882,7 @@
           <a:graphicData uri="http://schemas.openxmlformats.org/presentationml/2006/ole">
             <mc:AlternateContent xmlns:mc="http://schemas.openxmlformats.org/markup-compatibility/2006">
               <mc:Choice xmlns:v="urn:schemas-microsoft-com:vml" Requires="v">
-                <p:oleObj spid="_x0000_s2097" name="Equation" r:id="rId5" imgW="889000" imgH="190500" progId="Equation.DSMT4">
+                <p:oleObj spid="_x0000_s2100" name="Equation" r:id="rId5" imgW="889000" imgH="190500" progId="Equation.DSMT4">
                   <p:embed/>
                 </p:oleObj>
               </mc:Choice>

</xml_diff>